<commit_message>
minor graphics changes (fontsize etc)
</commit_message>
<xml_diff>
--- a/grafics/grafics.pptx
+++ b/grafics/grafics.pptx
@@ -7,25 +7,28 @@
   <p:sldIdLst>
     <p:sldId id="256" r:id="rId2"/>
     <p:sldId id="257" r:id="rId3"/>
-    <p:sldId id="258" r:id="rId4"/>
-    <p:sldId id="259" r:id="rId5"/>
-    <p:sldId id="260" r:id="rId6"/>
-    <p:sldId id="261" r:id="rId7"/>
-    <p:sldId id="276" r:id="rId8"/>
-    <p:sldId id="262" r:id="rId9"/>
-    <p:sldId id="263" r:id="rId10"/>
-    <p:sldId id="264" r:id="rId11"/>
-    <p:sldId id="265" r:id="rId12"/>
-    <p:sldId id="275" r:id="rId13"/>
-    <p:sldId id="267" r:id="rId14"/>
-    <p:sldId id="268" r:id="rId15"/>
-    <p:sldId id="269" r:id="rId16"/>
-    <p:sldId id="270" r:id="rId17"/>
-    <p:sldId id="271" r:id="rId18"/>
-    <p:sldId id="272" r:id="rId19"/>
-    <p:sldId id="273" r:id="rId20"/>
-    <p:sldId id="274" r:id="rId21"/>
-    <p:sldId id="266" r:id="rId22"/>
+    <p:sldId id="279" r:id="rId4"/>
+    <p:sldId id="258" r:id="rId5"/>
+    <p:sldId id="259" r:id="rId6"/>
+    <p:sldId id="260" r:id="rId7"/>
+    <p:sldId id="261" r:id="rId8"/>
+    <p:sldId id="276" r:id="rId9"/>
+    <p:sldId id="262" r:id="rId10"/>
+    <p:sldId id="277" r:id="rId11"/>
+    <p:sldId id="263" r:id="rId12"/>
+    <p:sldId id="264" r:id="rId13"/>
+    <p:sldId id="278" r:id="rId14"/>
+    <p:sldId id="265" r:id="rId15"/>
+    <p:sldId id="275" r:id="rId16"/>
+    <p:sldId id="267" r:id="rId17"/>
+    <p:sldId id="268" r:id="rId18"/>
+    <p:sldId id="269" r:id="rId19"/>
+    <p:sldId id="270" r:id="rId20"/>
+    <p:sldId id="271" r:id="rId21"/>
+    <p:sldId id="272" r:id="rId22"/>
+    <p:sldId id="273" r:id="rId23"/>
+    <p:sldId id="274" r:id="rId24"/>
+    <p:sldId id="266" r:id="rId25"/>
   </p:sldIdLst>
   <p:sldSz cx="12192000" cy="6858000"/>
   <p:notesSz cx="6858000" cy="9144000"/>
@@ -135,7 +138,7 @@
 <file path=ppt/revisionInfo.xml><?xml version="1.0" encoding="utf-8"?>
 <p1510:revInfo xmlns:a="http://schemas.openxmlformats.org/drawingml/2006/main" xmlns:r="http://schemas.openxmlformats.org/officeDocument/2006/relationships" xmlns:p1510="http://schemas.microsoft.com/office/powerpoint/2015/10/main">
   <p1510:revLst>
-    <p1510:client id="{1E4D2EC4-0EB4-4E91-B753-620F864E61E0}" v="61" dt="2023-03-22T15:03:50.688"/>
+    <p1510:client id="{1E4D2EC4-0EB4-4E91-B753-620F864E61E0}" v="82" dt="2023-03-23T12:23:55.752"/>
   </p1510:revLst>
 </p1510:revInfo>
 </file>
@@ -145,7 +148,7 @@
   <pc:docChgLst>
     <pc:chgData name="Lucas H" userId="c862aec739a91d48" providerId="LiveId" clId="{1E4D2EC4-0EB4-4E91-B753-620F864E61E0}"/>
     <pc:docChg chg="undo redo custSel addSld delSld modSld">
-      <pc:chgData name="Lucas H" userId="c862aec739a91d48" providerId="LiveId" clId="{1E4D2EC4-0EB4-4E91-B753-620F864E61E0}" dt="2023-03-22T15:12:33.795" v="248" actId="732"/>
+      <pc:chgData name="Lucas H" userId="c862aec739a91d48" providerId="LiveId" clId="{1E4D2EC4-0EB4-4E91-B753-620F864E61E0}" dt="2023-03-23T12:23:55.752" v="356" actId="164"/>
       <pc:docMkLst>
         <pc:docMk/>
       </pc:docMkLst>
@@ -173,7 +176,7 @@
         </pc:spChg>
       </pc:sldChg>
       <pc:sldChg chg="addSp delSp modSp new add del mod">
-        <pc:chgData name="Lucas H" userId="c862aec739a91d48" providerId="LiveId" clId="{1E4D2EC4-0EB4-4E91-B753-620F864E61E0}" dt="2023-03-22T10:17:51.964" v="83" actId="47"/>
+        <pc:chgData name="Lucas H" userId="c862aec739a91d48" providerId="LiveId" clId="{1E4D2EC4-0EB4-4E91-B753-620F864E61E0}" dt="2023-03-23T12:23:55.752" v="356" actId="164"/>
         <pc:sldMkLst>
           <pc:docMk/>
           <pc:sldMk cId="1608752479" sldId="257"/>
@@ -210,14 +213,54 @@
             <ac:spMk id="13" creationId="{4D7D2E33-0EDD-4628-9628-CE2E79CAB21B}"/>
           </ac:spMkLst>
         </pc:spChg>
+        <pc:spChg chg="del mod">
+          <ac:chgData name="Lucas H" userId="c862aec739a91d48" providerId="LiveId" clId="{1E4D2EC4-0EB4-4E91-B753-620F864E61E0}" dt="2023-03-23T12:22:19.513" v="340" actId="478"/>
+          <ac:spMkLst>
+            <pc:docMk/>
+            <pc:sldMk cId="1608752479" sldId="257"/>
+            <ac:spMk id="18" creationId="{B2002EA2-063B-41BF-A84D-A70C7A62DC9E}"/>
+          </ac:spMkLst>
+        </pc:spChg>
+        <pc:spChg chg="mod">
+          <ac:chgData name="Lucas H" userId="c862aec739a91d48" providerId="LiveId" clId="{1E4D2EC4-0EB4-4E91-B753-620F864E61E0}" dt="2023-03-23T12:21:07.459" v="317"/>
+          <ac:spMkLst>
+            <pc:docMk/>
+            <pc:sldMk cId="1608752479" sldId="257"/>
+            <ac:spMk id="19" creationId="{D2F98F09-F76E-4485-A2D8-62656E1F212A}"/>
+          </ac:spMkLst>
+        </pc:spChg>
+        <pc:spChg chg="add mod">
+          <ac:chgData name="Lucas H" userId="c862aec739a91d48" providerId="LiveId" clId="{1E4D2EC4-0EB4-4E91-B753-620F864E61E0}" dt="2023-03-23T12:23:55.752" v="356" actId="164"/>
+          <ac:spMkLst>
+            <pc:docMk/>
+            <pc:sldMk cId="1608752479" sldId="257"/>
+            <ac:spMk id="21" creationId="{AAA3E893-7E02-4EC2-84EE-F90E364CA56A}"/>
+          </ac:spMkLst>
+        </pc:spChg>
         <pc:grpChg chg="add mod">
-          <ac:chgData name="Lucas H" userId="c862aec739a91d48" providerId="LiveId" clId="{1E4D2EC4-0EB4-4E91-B753-620F864E61E0}" dt="2023-03-22T10:16:01.830" v="76" actId="164"/>
+          <ac:chgData name="Lucas H" userId="c862aec739a91d48" providerId="LiveId" clId="{1E4D2EC4-0EB4-4E91-B753-620F864E61E0}" dt="2023-03-23T12:23:55.752" v="356" actId="164"/>
+          <ac:grpSpMkLst>
+            <pc:docMk/>
+            <pc:sldMk cId="1608752479" sldId="257"/>
+            <ac:grpSpMk id="2" creationId="{2A55092A-C627-41E1-9739-911B9960807E}"/>
+          </ac:grpSpMkLst>
+        </pc:grpChg>
+        <pc:grpChg chg="add mod">
+          <ac:chgData name="Lucas H" userId="c862aec739a91d48" providerId="LiveId" clId="{1E4D2EC4-0EB4-4E91-B753-620F864E61E0}" dt="2023-03-23T12:23:55.752" v="356" actId="164"/>
           <ac:grpSpMkLst>
             <pc:docMk/>
             <pc:sldMk cId="1608752479" sldId="257"/>
             <ac:grpSpMk id="14" creationId="{D7CE7965-E818-4A56-805F-A6B28169554C}"/>
           </ac:grpSpMkLst>
         </pc:grpChg>
+        <pc:grpChg chg="add del mod">
+          <ac:chgData name="Lucas H" userId="c862aec739a91d48" providerId="LiveId" clId="{1E4D2EC4-0EB4-4E91-B753-620F864E61E0}" dt="2023-03-23T12:23:50.828" v="355" actId="478"/>
+          <ac:grpSpMkLst>
+            <pc:docMk/>
+            <pc:sldMk cId="1608752479" sldId="257"/>
+            <ac:grpSpMk id="15" creationId="{FB517661-BD84-4D2B-846C-08A197F958D9}"/>
+          </ac:grpSpMkLst>
+        </pc:grpChg>
         <pc:picChg chg="add del mod ord">
           <ac:chgData name="Lucas H" userId="c862aec739a91d48" providerId="LiveId" clId="{1E4D2EC4-0EB4-4E91-B753-620F864E61E0}" dt="2023-03-22T10:13:39.935" v="27" actId="478"/>
           <ac:picMkLst>
@@ -226,6 +269,14 @@
             <ac:picMk id="5" creationId="{2634D25B-91F7-4577-8634-5F8092935DD7}"/>
           </ac:picMkLst>
         </pc:picChg>
+        <pc:picChg chg="add mod">
+          <ac:chgData name="Lucas H" userId="c862aec739a91d48" providerId="LiveId" clId="{1E4D2EC4-0EB4-4E91-B753-620F864E61E0}" dt="2023-03-23T12:23:55.752" v="356" actId="164"/>
+          <ac:picMkLst>
+            <pc:docMk/>
+            <pc:sldMk cId="1608752479" sldId="257"/>
+            <ac:picMk id="7" creationId="{A10C9863-1D33-4505-B78C-759A2F052F0B}"/>
+          </ac:picMkLst>
+        </pc:picChg>
         <pc:picChg chg="add del mod">
           <ac:chgData name="Lucas H" userId="c862aec739a91d48" providerId="LiveId" clId="{1E4D2EC4-0EB4-4E91-B753-620F864E61E0}" dt="2023-03-22T10:13:39.519" v="26" actId="478"/>
           <ac:picMkLst>
@@ -235,6 +286,14 @@
           </ac:picMkLst>
         </pc:picChg>
         <pc:picChg chg="add mod">
+          <ac:chgData name="Lucas H" userId="c862aec739a91d48" providerId="LiveId" clId="{1E4D2EC4-0EB4-4E91-B753-620F864E61E0}" dt="2023-03-23T12:23:55.752" v="356" actId="164"/>
+          <ac:picMkLst>
+            <pc:docMk/>
+            <pc:sldMk cId="1608752479" sldId="257"/>
+            <ac:picMk id="8" creationId="{25516167-E969-44AA-A82B-315E2BB44BFF}"/>
+          </ac:picMkLst>
+        </pc:picChg>
+        <pc:picChg chg="add mod">
           <ac:chgData name="Lucas H" userId="c862aec739a91d48" providerId="LiveId" clId="{1E4D2EC4-0EB4-4E91-B753-620F864E61E0}" dt="2023-03-22T10:11:59.857" v="18" actId="571"/>
           <ac:picMkLst>
             <pc:docMk/>
@@ -251,6 +310,14 @@
           </ac:picMkLst>
         </pc:picChg>
         <pc:picChg chg="add mod">
+          <ac:chgData name="Lucas H" userId="c862aec739a91d48" providerId="LiveId" clId="{1E4D2EC4-0EB4-4E91-B753-620F864E61E0}" dt="2023-03-23T12:23:55.752" v="356" actId="164"/>
+          <ac:picMkLst>
+            <pc:docMk/>
+            <pc:sldMk cId="1608752479" sldId="257"/>
+            <ac:picMk id="9" creationId="{F0132C36-235A-4671-9AB6-74FAB06CFF58}"/>
+          </ac:picMkLst>
+        </pc:picChg>
+        <pc:picChg chg="add mod">
           <ac:chgData name="Lucas H" userId="c862aec739a91d48" providerId="LiveId" clId="{1E4D2EC4-0EB4-4E91-B753-620F864E61E0}" dt="2023-03-22T10:16:01.830" v="76" actId="164"/>
           <ac:picMkLst>
             <pc:docMk/>
@@ -264,6 +331,46 @@
             <pc:docMk/>
             <pc:sldMk cId="1608752479" sldId="257"/>
             <ac:picMk id="11" creationId="{0BF88B50-3881-48C0-AA5A-23A49C32466C}"/>
+          </ac:picMkLst>
+        </pc:picChg>
+        <pc:picChg chg="mod">
+          <ac:chgData name="Lucas H" userId="c862aec739a91d48" providerId="LiveId" clId="{1E4D2EC4-0EB4-4E91-B753-620F864E61E0}" dt="2023-03-23T12:21:07.459" v="317"/>
+          <ac:picMkLst>
+            <pc:docMk/>
+            <pc:sldMk cId="1608752479" sldId="257"/>
+            <ac:picMk id="16" creationId="{998C92C9-9ABB-4C16-BE8A-2390979C7FDE}"/>
+          </ac:picMkLst>
+        </pc:picChg>
+        <pc:picChg chg="mod modCrop">
+          <ac:chgData name="Lucas H" userId="c862aec739a91d48" providerId="LiveId" clId="{1E4D2EC4-0EB4-4E91-B753-620F864E61E0}" dt="2023-03-23T12:21:20.546" v="320" actId="732"/>
+          <ac:picMkLst>
+            <pc:docMk/>
+            <pc:sldMk cId="1608752479" sldId="257"/>
+            <ac:picMk id="17" creationId="{F3ED7222-7AD6-49A3-BDA9-7348947A9F19}"/>
+          </ac:picMkLst>
+        </pc:picChg>
+        <pc:picChg chg="add mod">
+          <ac:chgData name="Lucas H" userId="c862aec739a91d48" providerId="LiveId" clId="{1E4D2EC4-0EB4-4E91-B753-620F864E61E0}" dt="2023-03-23T12:23:55.752" v="356" actId="164"/>
+          <ac:picMkLst>
+            <pc:docMk/>
+            <pc:sldMk cId="1608752479" sldId="257"/>
+            <ac:picMk id="20" creationId="{F97A4161-797C-4509-9071-403D71DBA643}"/>
+          </ac:picMkLst>
+        </pc:picChg>
+        <pc:picChg chg="add mod">
+          <ac:chgData name="Lucas H" userId="c862aec739a91d48" providerId="LiveId" clId="{1E4D2EC4-0EB4-4E91-B753-620F864E61E0}" dt="2023-03-23T12:23:55.752" v="356" actId="164"/>
+          <ac:picMkLst>
+            <pc:docMk/>
+            <pc:sldMk cId="1608752479" sldId="257"/>
+            <ac:picMk id="22" creationId="{3390A770-54BA-4AF6-9BFE-051358849604}"/>
+          </ac:picMkLst>
+        </pc:picChg>
+        <pc:picChg chg="add mod modCrop">
+          <ac:chgData name="Lucas H" userId="c862aec739a91d48" providerId="LiveId" clId="{1E4D2EC4-0EB4-4E91-B753-620F864E61E0}" dt="2023-03-23T12:23:55.752" v="356" actId="164"/>
+          <ac:picMkLst>
+            <pc:docMk/>
+            <pc:sldMk cId="1608752479" sldId="257"/>
+            <ac:picMk id="23" creationId="{BAA4ECAC-1CE9-4987-9884-91E64F95E29A}"/>
           </ac:picMkLst>
         </pc:picChg>
       </pc:sldChg>
@@ -508,82 +615,154 @@
           </ac:picMkLst>
         </pc:picChg>
       </pc:sldChg>
-      <pc:sldChg chg="addSp modSp add mod">
-        <pc:chgData name="Lucas H" userId="c862aec739a91d48" providerId="LiveId" clId="{1E4D2EC4-0EB4-4E91-B753-620F864E61E0}" dt="2023-03-22T11:14:26.550" v="204" actId="164"/>
+      <pc:sldChg chg="addSp delSp modSp add mod">
+        <pc:chgData name="Lucas H" userId="c862aec739a91d48" providerId="LiveId" clId="{1E4D2EC4-0EB4-4E91-B753-620F864E61E0}" dt="2023-03-23T10:08:15.342" v="278" actId="164"/>
         <pc:sldMkLst>
           <pc:docMk/>
           <pc:sldMk cId="2986862466" sldId="263"/>
         </pc:sldMkLst>
-        <pc:spChg chg="add mod">
-          <ac:chgData name="Lucas H" userId="c862aec739a91d48" providerId="LiveId" clId="{1E4D2EC4-0EB4-4E91-B753-620F864E61E0}" dt="2023-03-22T11:14:26.550" v="204" actId="164"/>
+        <pc:spChg chg="add mod topLvl">
+          <ac:chgData name="Lucas H" userId="c862aec739a91d48" providerId="LiveId" clId="{1E4D2EC4-0EB4-4E91-B753-620F864E61E0}" dt="2023-03-23T10:07:29.500" v="271" actId="165"/>
           <ac:spMkLst>
             <pc:docMk/>
             <pc:sldMk cId="2986862466" sldId="263"/>
             <ac:spMk id="3" creationId="{4859D943-C35C-4B26-88FB-10078045F4C7}"/>
           </ac:spMkLst>
         </pc:spChg>
-        <pc:spChg chg="add mod">
-          <ac:chgData name="Lucas H" userId="c862aec739a91d48" providerId="LiveId" clId="{1E4D2EC4-0EB4-4E91-B753-620F864E61E0}" dt="2023-03-22T11:14:26.550" v="204" actId="164"/>
+        <pc:spChg chg="add mod topLvl">
+          <ac:chgData name="Lucas H" userId="c862aec739a91d48" providerId="LiveId" clId="{1E4D2EC4-0EB4-4E91-B753-620F864E61E0}" dt="2023-03-23T10:07:29.500" v="271" actId="165"/>
           <ac:spMkLst>
             <pc:docMk/>
             <pc:sldMk cId="2986862466" sldId="263"/>
             <ac:spMk id="4" creationId="{76E78B6F-387F-457D-9F5D-AAC91CFF73AB}"/>
           </ac:spMkLst>
         </pc:spChg>
-        <pc:spChg chg="add mod">
-          <ac:chgData name="Lucas H" userId="c862aec739a91d48" providerId="LiveId" clId="{1E4D2EC4-0EB4-4E91-B753-620F864E61E0}" dt="2023-03-22T11:14:26.550" v="204" actId="164"/>
+        <pc:spChg chg="add mod topLvl">
+          <ac:chgData name="Lucas H" userId="c862aec739a91d48" providerId="LiveId" clId="{1E4D2EC4-0EB4-4E91-B753-620F864E61E0}" dt="2023-03-23T10:07:29.500" v="271" actId="165"/>
           <ac:spMkLst>
             <pc:docMk/>
             <pc:sldMk cId="2986862466" sldId="263"/>
             <ac:spMk id="5" creationId="{2663BE87-97F4-408B-9BF6-362188E12DBB}"/>
           </ac:spMkLst>
         </pc:spChg>
-        <pc:spChg chg="add mod">
-          <ac:chgData name="Lucas H" userId="c862aec739a91d48" providerId="LiveId" clId="{1E4D2EC4-0EB4-4E91-B753-620F864E61E0}" dt="2023-03-22T11:14:26.550" v="204" actId="164"/>
+        <pc:spChg chg="add mod topLvl">
+          <ac:chgData name="Lucas H" userId="c862aec739a91d48" providerId="LiveId" clId="{1E4D2EC4-0EB4-4E91-B753-620F864E61E0}" dt="2023-03-23T10:07:29.500" v="271" actId="165"/>
           <ac:spMkLst>
             <pc:docMk/>
             <pc:sldMk cId="2986862466" sldId="263"/>
             <ac:spMk id="6" creationId="{7AB1CA2F-4C83-4E1F-B22D-8AEC79F9CF74}"/>
           </ac:spMkLst>
         </pc:spChg>
-        <pc:spChg chg="add mod">
-          <ac:chgData name="Lucas H" userId="c862aec739a91d48" providerId="LiveId" clId="{1E4D2EC4-0EB4-4E91-B753-620F864E61E0}" dt="2023-03-22T11:14:26.550" v="204" actId="164"/>
+        <pc:spChg chg="add mod topLvl">
+          <ac:chgData name="Lucas H" userId="c862aec739a91d48" providerId="LiveId" clId="{1E4D2EC4-0EB4-4E91-B753-620F864E61E0}" dt="2023-03-23T10:07:29.500" v="271" actId="165"/>
           <ac:spMkLst>
             <pc:docMk/>
             <pc:sldMk cId="2986862466" sldId="263"/>
             <ac:spMk id="7" creationId="{246007F0-E608-4BB8-91FC-6A36D9C1D256}"/>
           </ac:spMkLst>
         </pc:spChg>
-        <pc:spChg chg="add mod">
-          <ac:chgData name="Lucas H" userId="c862aec739a91d48" providerId="LiveId" clId="{1E4D2EC4-0EB4-4E91-B753-620F864E61E0}" dt="2023-03-22T11:14:26.550" v="204" actId="164"/>
+        <pc:spChg chg="add mod topLvl">
+          <ac:chgData name="Lucas H" userId="c862aec739a91d48" providerId="LiveId" clId="{1E4D2EC4-0EB4-4E91-B753-620F864E61E0}" dt="2023-03-23T10:07:29.500" v="271" actId="165"/>
           <ac:spMkLst>
             <pc:docMk/>
             <pc:sldMk cId="2986862466" sldId="263"/>
             <ac:spMk id="8" creationId="{A1270D32-655B-4141-873F-984FBB3142B2}"/>
           </ac:spMkLst>
         </pc:spChg>
-        <pc:spChg chg="add mod">
-          <ac:chgData name="Lucas H" userId="c862aec739a91d48" providerId="LiveId" clId="{1E4D2EC4-0EB4-4E91-B753-620F864E61E0}" dt="2023-03-22T11:14:26.550" v="204" actId="164"/>
+        <pc:spChg chg="add mod topLvl">
+          <ac:chgData name="Lucas H" userId="c862aec739a91d48" providerId="LiveId" clId="{1E4D2EC4-0EB4-4E91-B753-620F864E61E0}" dt="2023-03-23T10:07:29.500" v="271" actId="165"/>
           <ac:spMkLst>
             <pc:docMk/>
             <pc:sldMk cId="2986862466" sldId="263"/>
             <ac:spMk id="9" creationId="{6EEC0829-EF48-4D60-B6BF-73EA0342B29F}"/>
           </ac:spMkLst>
         </pc:spChg>
-        <pc:grpChg chg="add mod">
-          <ac:chgData name="Lucas H" userId="c862aec739a91d48" providerId="LiveId" clId="{1E4D2EC4-0EB4-4E91-B753-620F864E61E0}" dt="2023-03-22T11:14:26.550" v="204" actId="164"/>
+        <pc:spChg chg="add mod">
+          <ac:chgData name="Lucas H" userId="c862aec739a91d48" providerId="LiveId" clId="{1E4D2EC4-0EB4-4E91-B753-620F864E61E0}" dt="2023-03-23T10:08:15.342" v="278" actId="164"/>
+          <ac:spMkLst>
+            <pc:docMk/>
+            <pc:sldMk cId="2986862466" sldId="263"/>
+            <ac:spMk id="13" creationId="{897C361E-4A37-4350-A1BA-E3870E7919B2}"/>
+          </ac:spMkLst>
+        </pc:spChg>
+        <pc:spChg chg="add mod">
+          <ac:chgData name="Lucas H" userId="c862aec739a91d48" providerId="LiveId" clId="{1E4D2EC4-0EB4-4E91-B753-620F864E61E0}" dt="2023-03-23T10:08:15.342" v="278" actId="164"/>
+          <ac:spMkLst>
+            <pc:docMk/>
+            <pc:sldMk cId="2986862466" sldId="263"/>
+            <ac:spMk id="14" creationId="{16C82EB7-3DE9-4B0C-A9CE-6E1954D30FAA}"/>
+          </ac:spMkLst>
+        </pc:spChg>
+        <pc:spChg chg="add mod">
+          <ac:chgData name="Lucas H" userId="c862aec739a91d48" providerId="LiveId" clId="{1E4D2EC4-0EB4-4E91-B753-620F864E61E0}" dt="2023-03-23T10:08:15.342" v="278" actId="164"/>
+          <ac:spMkLst>
+            <pc:docMk/>
+            <pc:sldMk cId="2986862466" sldId="263"/>
+            <ac:spMk id="15" creationId="{FF4DFD2B-01E1-465F-8FEB-0A5D116C88EE}"/>
+          </ac:spMkLst>
+        </pc:spChg>
+        <pc:spChg chg="add mod">
+          <ac:chgData name="Lucas H" userId="c862aec739a91d48" providerId="LiveId" clId="{1E4D2EC4-0EB4-4E91-B753-620F864E61E0}" dt="2023-03-23T10:08:15.342" v="278" actId="164"/>
+          <ac:spMkLst>
+            <pc:docMk/>
+            <pc:sldMk cId="2986862466" sldId="263"/>
+            <ac:spMk id="16" creationId="{2D65D239-7E54-41F0-8F26-9FB5A4EDB254}"/>
+          </ac:spMkLst>
+        </pc:spChg>
+        <pc:spChg chg="add mod">
+          <ac:chgData name="Lucas H" userId="c862aec739a91d48" providerId="LiveId" clId="{1E4D2EC4-0EB4-4E91-B753-620F864E61E0}" dt="2023-03-23T10:08:15.342" v="278" actId="164"/>
+          <ac:spMkLst>
+            <pc:docMk/>
+            <pc:sldMk cId="2986862466" sldId="263"/>
+            <ac:spMk id="17" creationId="{83AAAF07-5D86-47A5-AE55-D3A0AED688F2}"/>
+          </ac:spMkLst>
+        </pc:spChg>
+        <pc:spChg chg="add mod">
+          <ac:chgData name="Lucas H" userId="c862aec739a91d48" providerId="LiveId" clId="{1E4D2EC4-0EB4-4E91-B753-620F864E61E0}" dt="2023-03-23T10:08:15.342" v="278" actId="164"/>
+          <ac:spMkLst>
+            <pc:docMk/>
+            <pc:sldMk cId="2986862466" sldId="263"/>
+            <ac:spMk id="18" creationId="{BA55ECD0-82A0-45DB-B0CF-7A3BAEEEEBD4}"/>
+          </ac:spMkLst>
+        </pc:spChg>
+        <pc:spChg chg="add mod">
+          <ac:chgData name="Lucas H" userId="c862aec739a91d48" providerId="LiveId" clId="{1E4D2EC4-0EB4-4E91-B753-620F864E61E0}" dt="2023-03-23T10:08:15.342" v="278" actId="164"/>
+          <ac:spMkLst>
+            <pc:docMk/>
+            <pc:sldMk cId="2986862466" sldId="263"/>
+            <ac:spMk id="19" creationId="{750C43A6-1A17-4A22-81EC-BA55D92B00FA}"/>
+          </ac:spMkLst>
+        </pc:spChg>
+        <pc:grpChg chg="add del mod">
+          <ac:chgData name="Lucas H" userId="c862aec739a91d48" providerId="LiveId" clId="{1E4D2EC4-0EB4-4E91-B753-620F864E61E0}" dt="2023-03-23T10:07:29.500" v="271" actId="165"/>
           <ac:grpSpMkLst>
             <pc:docMk/>
             <pc:sldMk cId="2986862466" sldId="263"/>
             <ac:grpSpMk id="10" creationId="{7DC4B550-49AD-44DA-9BDB-FE8A014B4A0C}"/>
           </ac:grpSpMkLst>
         </pc:grpChg>
-        <pc:picChg chg="add mod">
-          <ac:chgData name="Lucas H" userId="c862aec739a91d48" providerId="LiveId" clId="{1E4D2EC4-0EB4-4E91-B753-620F864E61E0}" dt="2023-03-22T11:14:26.550" v="204" actId="164"/>
+        <pc:grpChg chg="add mod">
+          <ac:chgData name="Lucas H" userId="c862aec739a91d48" providerId="LiveId" clId="{1E4D2EC4-0EB4-4E91-B753-620F864E61E0}" dt="2023-03-23T10:08:15.342" v="278" actId="164"/>
+          <ac:grpSpMkLst>
+            <pc:docMk/>
+            <pc:sldMk cId="2986862466" sldId="263"/>
+            <ac:grpSpMk id="20" creationId="{57F4423D-DF98-4657-A0B9-E9D223647094}"/>
+          </ac:grpSpMkLst>
+        </pc:grpChg>
+        <pc:picChg chg="add mod topLvl">
+          <ac:chgData name="Lucas H" userId="c862aec739a91d48" providerId="LiveId" clId="{1E4D2EC4-0EB4-4E91-B753-620F864E61E0}" dt="2023-03-23T10:07:29.500" v="271" actId="165"/>
           <ac:picMkLst>
             <pc:docMk/>
             <pc:sldMk cId="2986862466" sldId="263"/>
             <ac:picMk id="2" creationId="{17DE90D8-06D7-4452-8D1F-63E288DCF25B}"/>
+          </ac:picMkLst>
+        </pc:picChg>
+        <pc:picChg chg="add mod">
+          <ac:chgData name="Lucas H" userId="c862aec739a91d48" providerId="LiveId" clId="{1E4D2EC4-0EB4-4E91-B753-620F864E61E0}" dt="2023-03-23T10:08:15.342" v="278" actId="164"/>
+          <ac:picMkLst>
+            <pc:docMk/>
+            <pc:sldMk cId="2986862466" sldId="263"/>
+            <ac:picMk id="12" creationId="{F16B5FA7-0306-4712-8AA5-26E6E4004CA7}"/>
           </ac:picMkLst>
         </pc:picChg>
       </pc:sldChg>
@@ -786,6 +965,131 @@
             <pc:docMk/>
             <pc:sldMk cId="2703318218" sldId="276"/>
             <ac:picMk id="6" creationId="{585EB0D1-CC43-435B-999D-C1453F26D9DD}"/>
+          </ac:picMkLst>
+        </pc:picChg>
+      </pc:sldChg>
+      <pc:sldChg chg="addSp delSp modSp new mod">
+        <pc:chgData name="Lucas H" userId="c862aec739a91d48" providerId="LiveId" clId="{1E4D2EC4-0EB4-4E91-B753-620F864E61E0}" dt="2023-03-23T09:58:30.482" v="262" actId="732"/>
+        <pc:sldMkLst>
+          <pc:docMk/>
+          <pc:sldMk cId="167610177" sldId="277"/>
+        </pc:sldMkLst>
+        <pc:spChg chg="del">
+          <ac:chgData name="Lucas H" userId="c862aec739a91d48" providerId="LiveId" clId="{1E4D2EC4-0EB4-4E91-B753-620F864E61E0}" dt="2023-03-23T09:57:17.634" v="251" actId="478"/>
+          <ac:spMkLst>
+            <pc:docMk/>
+            <pc:sldMk cId="167610177" sldId="277"/>
+            <ac:spMk id="2" creationId="{7C89987D-A9E6-4075-A363-A9D0829018CF}"/>
+          </ac:spMkLst>
+        </pc:spChg>
+        <pc:spChg chg="del">
+          <ac:chgData name="Lucas H" userId="c862aec739a91d48" providerId="LiveId" clId="{1E4D2EC4-0EB4-4E91-B753-620F864E61E0}" dt="2023-03-23T09:57:18.764" v="252" actId="478"/>
+          <ac:spMkLst>
+            <pc:docMk/>
+            <pc:sldMk cId="167610177" sldId="277"/>
+            <ac:spMk id="3" creationId="{82392054-35B8-4602-A646-15A210213F13}"/>
+          </ac:spMkLst>
+        </pc:spChg>
+        <pc:grpChg chg="add mod">
+          <ac:chgData name="Lucas H" userId="c862aec739a91d48" providerId="LiveId" clId="{1E4D2EC4-0EB4-4E91-B753-620F864E61E0}" dt="2023-03-23T09:58:18.045" v="260" actId="164"/>
+          <ac:grpSpMkLst>
+            <pc:docMk/>
+            <pc:sldMk cId="167610177" sldId="277"/>
+            <ac:grpSpMk id="7" creationId="{F6D4241A-2515-42D8-9293-F3683E53ECBE}"/>
+          </ac:grpSpMkLst>
+        </pc:grpChg>
+        <pc:picChg chg="add mod modCrop">
+          <ac:chgData name="Lucas H" userId="c862aec739a91d48" providerId="LiveId" clId="{1E4D2EC4-0EB4-4E91-B753-620F864E61E0}" dt="2023-03-23T09:58:30.482" v="262" actId="732"/>
+          <ac:picMkLst>
+            <pc:docMk/>
+            <pc:sldMk cId="167610177" sldId="277"/>
+            <ac:picMk id="5" creationId="{9FCB98F1-272A-48FE-9DC4-8F8A9B31DA21}"/>
+          </ac:picMkLst>
+        </pc:picChg>
+        <pc:picChg chg="add mod modCrop">
+          <ac:chgData name="Lucas H" userId="c862aec739a91d48" providerId="LiveId" clId="{1E4D2EC4-0EB4-4E91-B753-620F864E61E0}" dt="2023-03-23T09:58:18.045" v="260" actId="164"/>
+          <ac:picMkLst>
+            <pc:docMk/>
+            <pc:sldMk cId="167610177" sldId="277"/>
+            <ac:picMk id="6" creationId="{A56C872B-DE2A-47F7-B1B0-7E44DD33FF20}"/>
+          </ac:picMkLst>
+        </pc:picChg>
+      </pc:sldChg>
+      <pc:sldChg chg="addSp delSp new mod">
+        <pc:chgData name="Lucas H" userId="c862aec739a91d48" providerId="LiveId" clId="{1E4D2EC4-0EB4-4E91-B753-620F864E61E0}" dt="2023-03-23T10:08:25.256" v="282"/>
+        <pc:sldMkLst>
+          <pc:docMk/>
+          <pc:sldMk cId="1836690398" sldId="278"/>
+        </pc:sldMkLst>
+        <pc:spChg chg="del">
+          <ac:chgData name="Lucas H" userId="c862aec739a91d48" providerId="LiveId" clId="{1E4D2EC4-0EB4-4E91-B753-620F864E61E0}" dt="2023-03-23T10:08:22.726" v="280" actId="478"/>
+          <ac:spMkLst>
+            <pc:docMk/>
+            <pc:sldMk cId="1836690398" sldId="278"/>
+            <ac:spMk id="2" creationId="{17497A5C-6C51-4242-B537-806ED1D92152}"/>
+          </ac:spMkLst>
+        </pc:spChg>
+        <pc:spChg chg="del">
+          <ac:chgData name="Lucas H" userId="c862aec739a91d48" providerId="LiveId" clId="{1E4D2EC4-0EB4-4E91-B753-620F864E61E0}" dt="2023-03-23T10:08:24.061" v="281" actId="478"/>
+          <ac:spMkLst>
+            <pc:docMk/>
+            <pc:sldMk cId="1836690398" sldId="278"/>
+            <ac:spMk id="3" creationId="{521691B3-D54B-441D-AB94-9A86B2DCF297}"/>
+          </ac:spMkLst>
+        </pc:spChg>
+        <pc:picChg chg="add">
+          <ac:chgData name="Lucas H" userId="c862aec739a91d48" providerId="LiveId" clId="{1E4D2EC4-0EB4-4E91-B753-620F864E61E0}" dt="2023-03-23T10:08:25.256" v="282"/>
+          <ac:picMkLst>
+            <pc:docMk/>
+            <pc:sldMk cId="1836690398" sldId="278"/>
+            <ac:picMk id="4" creationId="{3EB0655C-327E-498E-8767-71229602701B}"/>
+          </ac:picMkLst>
+        </pc:picChg>
+      </pc:sldChg>
+      <pc:sldChg chg="addSp delSp modSp add mod">
+        <pc:chgData name="Lucas H" userId="c862aec739a91d48" providerId="LiveId" clId="{1E4D2EC4-0EB4-4E91-B753-620F864E61E0}" dt="2023-03-23T12:23:30.905" v="351" actId="732"/>
+        <pc:sldMkLst>
+          <pc:docMk/>
+          <pc:sldMk cId="3711372505" sldId="279"/>
+        </pc:sldMkLst>
+        <pc:grpChg chg="del">
+          <ac:chgData name="Lucas H" userId="c862aec739a91d48" providerId="LiveId" clId="{1E4D2EC4-0EB4-4E91-B753-620F864E61E0}" dt="2023-03-23T12:18:09.040" v="284" actId="478"/>
+          <ac:grpSpMkLst>
+            <pc:docMk/>
+            <pc:sldMk cId="3711372505" sldId="279"/>
+            <ac:grpSpMk id="14" creationId="{D7CE7965-E818-4A56-805F-A6B28169554C}"/>
+          </ac:grpSpMkLst>
+        </pc:grpChg>
+        <pc:picChg chg="add del mod modCrop">
+          <ac:chgData name="Lucas H" userId="c862aec739a91d48" providerId="LiveId" clId="{1E4D2EC4-0EB4-4E91-B753-620F864E61E0}" dt="2023-03-23T12:20:50.989" v="314" actId="732"/>
+          <ac:picMkLst>
+            <pc:docMk/>
+            <pc:sldMk cId="3711372505" sldId="279"/>
+            <ac:picMk id="3" creationId="{DE178B76-E7A3-4D4A-9A5B-DD55767B8AC8}"/>
+          </ac:picMkLst>
+        </pc:picChg>
+        <pc:picChg chg="add mod modCrop">
+          <ac:chgData name="Lucas H" userId="c862aec739a91d48" providerId="LiveId" clId="{1E4D2EC4-0EB4-4E91-B753-620F864E61E0}" dt="2023-03-23T12:23:30.905" v="351" actId="732"/>
+          <ac:picMkLst>
+            <pc:docMk/>
+            <pc:sldMk cId="3711372505" sldId="279"/>
+            <ac:picMk id="5" creationId="{85B3C077-2E34-4320-A766-441B9CC0EA6B}"/>
+          </ac:picMkLst>
+        </pc:picChg>
+        <pc:picChg chg="add mod">
+          <ac:chgData name="Lucas H" userId="c862aec739a91d48" providerId="LiveId" clId="{1E4D2EC4-0EB4-4E91-B753-620F864E61E0}" dt="2023-03-23T12:18:54.275" v="295" actId="571"/>
+          <ac:picMkLst>
+            <pc:docMk/>
+            <pc:sldMk cId="3711372505" sldId="279"/>
+            <ac:picMk id="15" creationId="{43F038C9-42BB-49EB-91C9-F697B84D5930}"/>
+          </ac:picMkLst>
+        </pc:picChg>
+        <pc:picChg chg="add mod">
+          <ac:chgData name="Lucas H" userId="c862aec739a91d48" providerId="LiveId" clId="{1E4D2EC4-0EB4-4E91-B753-620F864E61E0}" dt="2023-03-23T12:18:54.275" v="295" actId="571"/>
+          <ac:picMkLst>
+            <pc:docMk/>
+            <pc:sldMk cId="3711372505" sldId="279"/>
+            <ac:picMk id="16" creationId="{58785536-B9D8-4B1E-984E-280D718D31A6}"/>
           </ac:picMkLst>
         </pc:picChg>
       </pc:sldChg>
@@ -1367,6 +1671,750 @@
           <a:chExt cx="0" cy="0"/>
         </a:xfrm>
       </p:grpSpPr>
+      <p:grpSp>
+        <p:nvGrpSpPr>
+          <p:cNvPr id="7" name="Gruppieren 6">
+            <a:extLst>
+              <a:ext uri="{FF2B5EF4-FFF2-40B4-BE49-F238E27FC236}">
+                <a16:creationId xmlns:a16="http://schemas.microsoft.com/office/drawing/2014/main" id="{F6D4241A-2515-42D8-9293-F3683E53ECBE}"/>
+              </a:ext>
+            </a:extLst>
+          </p:cNvPr>
+          <p:cNvGrpSpPr/>
+          <p:nvPr/>
+        </p:nvGrpSpPr>
+        <p:grpSpPr>
+          <a:xfrm>
+            <a:off x="2719754" y="351692"/>
+            <a:ext cx="6385169" cy="6015770"/>
+            <a:chOff x="2719754" y="351692"/>
+            <a:chExt cx="6385169" cy="6015770"/>
+          </a:xfrm>
+        </p:grpSpPr>
+        <p:pic>
+          <p:nvPicPr>
+            <p:cNvPr id="5" name="Grafik 4">
+              <a:extLst>
+                <a:ext uri="{FF2B5EF4-FFF2-40B4-BE49-F238E27FC236}">
+                  <a16:creationId xmlns:a16="http://schemas.microsoft.com/office/drawing/2014/main" id="{9FCB98F1-272A-48FE-9DC4-8F8A9B31DA21}"/>
+                </a:ext>
+              </a:extLst>
+            </p:cNvPr>
+            <p:cNvPicPr>
+              <a:picLocks noChangeAspect="1"/>
+            </p:cNvPicPr>
+            <p:nvPr/>
+          </p:nvPicPr>
+          <p:blipFill rotWithShape="1">
+            <a:blip r:embed="rId2"/>
+            <a:srcRect l="7191" r="11848"/>
+            <a:stretch/>
+          </p:blipFill>
+          <p:spPr>
+            <a:xfrm>
+              <a:off x="2719754" y="490537"/>
+              <a:ext cx="6385169" cy="5876925"/>
+            </a:xfrm>
+            <a:prstGeom prst="rect">
+              <a:avLst/>
+            </a:prstGeom>
+          </p:spPr>
+        </p:pic>
+        <p:pic>
+          <p:nvPicPr>
+            <p:cNvPr id="6" name="Grafik 5">
+              <a:extLst>
+                <a:ext uri="{FF2B5EF4-FFF2-40B4-BE49-F238E27FC236}">
+                  <a16:creationId xmlns:a16="http://schemas.microsoft.com/office/drawing/2014/main" id="{A56C872B-DE2A-47F7-B1B0-7E44DD33FF20}"/>
+                </a:ext>
+              </a:extLst>
+            </p:cNvPr>
+            <p:cNvPicPr>
+              <a:picLocks noChangeAspect="1"/>
+            </p:cNvPicPr>
+            <p:nvPr/>
+          </p:nvPicPr>
+          <p:blipFill rotWithShape="1">
+            <a:blip r:embed="rId3"/>
+            <a:srcRect l="32785" t="316" r="41377" b="94190"/>
+            <a:stretch/>
+          </p:blipFill>
+          <p:spPr>
+            <a:xfrm>
+              <a:off x="4509476" y="351692"/>
+              <a:ext cx="2047631" cy="295152"/>
+            </a:xfrm>
+            <a:prstGeom prst="rect">
+              <a:avLst/>
+            </a:prstGeom>
+          </p:spPr>
+        </p:pic>
+      </p:grpSp>
+    </p:spTree>
+    <p:extLst>
+      <p:ext uri="{BB962C8B-B14F-4D97-AF65-F5344CB8AC3E}">
+        <p14:creationId xmlns:p14="http://schemas.microsoft.com/office/powerpoint/2010/main" val="167610177"/>
+      </p:ext>
+    </p:extLst>
+  </p:cSld>
+  <p:clrMapOvr>
+    <a:masterClrMapping/>
+  </p:clrMapOvr>
+</p:sld>
+</file>
+
+<file path=ppt/slides/slide11.xml><?xml version="1.0" encoding="utf-8"?>
+<p:sld xmlns:a="http://schemas.openxmlformats.org/drawingml/2006/main" xmlns:r="http://schemas.openxmlformats.org/officeDocument/2006/relationships" xmlns:p="http://schemas.openxmlformats.org/presentationml/2006/main">
+  <p:cSld>
+    <p:spTree>
+      <p:nvGrpSpPr>
+        <p:cNvPr id="1" name=""/>
+        <p:cNvGrpSpPr/>
+        <p:nvPr/>
+      </p:nvGrpSpPr>
+      <p:grpSpPr>
+        <a:xfrm>
+          <a:off x="0" y="0"/>
+          <a:ext cx="0" cy="0"/>
+          <a:chOff x="0" y="0"/>
+          <a:chExt cx="0" cy="0"/>
+        </a:xfrm>
+      </p:grpSpPr>
+      <p:pic>
+        <p:nvPicPr>
+          <p:cNvPr id="2" name="Grafik 1">
+            <a:extLst>
+              <a:ext uri="{FF2B5EF4-FFF2-40B4-BE49-F238E27FC236}">
+                <a16:creationId xmlns:a16="http://schemas.microsoft.com/office/drawing/2014/main" id="{17DE90D8-06D7-4452-8D1F-63E288DCF25B}"/>
+              </a:ext>
+            </a:extLst>
+          </p:cNvPr>
+          <p:cNvPicPr>
+            <a:picLocks noChangeAspect="1"/>
+          </p:cNvPicPr>
+          <p:nvPr/>
+        </p:nvPicPr>
+        <p:blipFill>
+          <a:blip r:embed="rId2"/>
+          <a:stretch>
+            <a:fillRect/>
+          </a:stretch>
+        </p:blipFill>
+        <p:spPr>
+          <a:xfrm>
+            <a:off x="1516938" y="987316"/>
+            <a:ext cx="6619875" cy="3543300"/>
+          </a:xfrm>
+          <a:prstGeom prst="rect">
+            <a:avLst/>
+          </a:prstGeom>
+        </p:spPr>
+      </p:pic>
+      <p:sp>
+        <p:nvSpPr>
+          <p:cNvPr id="3" name="Textfeld 2">
+            <a:extLst>
+              <a:ext uri="{FF2B5EF4-FFF2-40B4-BE49-F238E27FC236}">
+                <a16:creationId xmlns:a16="http://schemas.microsoft.com/office/drawing/2014/main" id="{4859D943-C35C-4B26-88FB-10078045F4C7}"/>
+              </a:ext>
+            </a:extLst>
+          </p:cNvPr>
+          <p:cNvSpPr txBox="1"/>
+          <p:nvPr/>
+        </p:nvSpPr>
+        <p:spPr>
+          <a:xfrm>
+            <a:off x="5896785" y="2620466"/>
+            <a:ext cx="1166327" cy="276999"/>
+          </a:xfrm>
+          <a:prstGeom prst="rect">
+            <a:avLst/>
+          </a:prstGeom>
+          <a:noFill/>
+        </p:spPr>
+        <p:txBody>
+          <a:bodyPr wrap="square" rtlCol="0">
+            <a:spAutoFit/>
+          </a:bodyPr>
+          <a:lstStyle/>
+          <a:p>
+            <a:r>
+              <a:rPr lang="de-AT" sz="1200" dirty="0">
+                <a:latin typeface="DejaVu Sans"/>
+              </a:rPr>
+              <a:t>flat1</a:t>
+            </a:r>
+          </a:p>
+        </p:txBody>
+      </p:sp>
+      <p:sp>
+        <p:nvSpPr>
+          <p:cNvPr id="4" name="Textfeld 3">
+            <a:extLst>
+              <a:ext uri="{FF2B5EF4-FFF2-40B4-BE49-F238E27FC236}">
+                <a16:creationId xmlns:a16="http://schemas.microsoft.com/office/drawing/2014/main" id="{76E78B6F-387F-457D-9F5D-AAC91CFF73AB}"/>
+              </a:ext>
+            </a:extLst>
+          </p:cNvPr>
+          <p:cNvSpPr txBox="1"/>
+          <p:nvPr/>
+        </p:nvSpPr>
+        <p:spPr>
+          <a:xfrm>
+            <a:off x="4117748" y="3351364"/>
+            <a:ext cx="1166327" cy="276999"/>
+          </a:xfrm>
+          <a:prstGeom prst="rect">
+            <a:avLst/>
+          </a:prstGeom>
+          <a:noFill/>
+        </p:spPr>
+        <p:txBody>
+          <a:bodyPr wrap="square" rtlCol="0">
+            <a:spAutoFit/>
+          </a:bodyPr>
+          <a:lstStyle/>
+          <a:p>
+            <a:r>
+              <a:rPr lang="de-AT" sz="1200" dirty="0">
+                <a:latin typeface="DejaVu Sans"/>
+              </a:rPr>
+              <a:t>uphill1</a:t>
+            </a:r>
+          </a:p>
+        </p:txBody>
+      </p:sp>
+      <p:sp>
+        <p:nvSpPr>
+          <p:cNvPr id="5" name="Textfeld 4">
+            <a:extLst>
+              <a:ext uri="{FF2B5EF4-FFF2-40B4-BE49-F238E27FC236}">
+                <a16:creationId xmlns:a16="http://schemas.microsoft.com/office/drawing/2014/main" id="{2663BE87-97F4-408B-9BF6-362188E12DBB}"/>
+              </a:ext>
+            </a:extLst>
+          </p:cNvPr>
+          <p:cNvSpPr txBox="1"/>
+          <p:nvPr/>
+        </p:nvSpPr>
+        <p:spPr>
+          <a:xfrm>
+            <a:off x="3534584" y="3663991"/>
+            <a:ext cx="1166327" cy="276999"/>
+          </a:xfrm>
+          <a:prstGeom prst="rect">
+            <a:avLst/>
+          </a:prstGeom>
+          <a:noFill/>
+        </p:spPr>
+        <p:txBody>
+          <a:bodyPr wrap="square" rtlCol="0">
+            <a:spAutoFit/>
+          </a:bodyPr>
+          <a:lstStyle/>
+          <a:p>
+            <a:r>
+              <a:rPr lang="de-AT" sz="1200" dirty="0">
+                <a:latin typeface="DejaVu Sans"/>
+              </a:rPr>
+              <a:t>down1</a:t>
+            </a:r>
+          </a:p>
+        </p:txBody>
+      </p:sp>
+      <p:sp>
+        <p:nvSpPr>
+          <p:cNvPr id="6" name="Textfeld 5">
+            <a:extLst>
+              <a:ext uri="{FF2B5EF4-FFF2-40B4-BE49-F238E27FC236}">
+                <a16:creationId xmlns:a16="http://schemas.microsoft.com/office/drawing/2014/main" id="{7AB1CA2F-4C83-4E1F-B22D-8AEC79F9CF74}"/>
+              </a:ext>
+            </a:extLst>
+          </p:cNvPr>
+          <p:cNvSpPr txBox="1"/>
+          <p:nvPr/>
+        </p:nvSpPr>
+        <p:spPr>
+          <a:xfrm>
+            <a:off x="2632625" y="3628363"/>
+            <a:ext cx="1166327" cy="276999"/>
+          </a:xfrm>
+          <a:prstGeom prst="rect">
+            <a:avLst/>
+          </a:prstGeom>
+          <a:noFill/>
+        </p:spPr>
+        <p:txBody>
+          <a:bodyPr wrap="square" rtlCol="0">
+            <a:spAutoFit/>
+          </a:bodyPr>
+          <a:lstStyle/>
+          <a:p>
+            <a:r>
+              <a:rPr lang="de-AT" sz="1200" dirty="0">
+                <a:latin typeface="DejaVu Sans"/>
+              </a:rPr>
+              <a:t>turn</a:t>
+            </a:r>
+          </a:p>
+        </p:txBody>
+      </p:sp>
+      <p:sp>
+        <p:nvSpPr>
+          <p:cNvPr id="7" name="Textfeld 6">
+            <a:extLst>
+              <a:ext uri="{FF2B5EF4-FFF2-40B4-BE49-F238E27FC236}">
+                <a16:creationId xmlns:a16="http://schemas.microsoft.com/office/drawing/2014/main" id="{246007F0-E608-4BB8-91FC-6A36D9C1D256}"/>
+              </a:ext>
+            </a:extLst>
+          </p:cNvPr>
+          <p:cNvSpPr txBox="1"/>
+          <p:nvPr/>
+        </p:nvSpPr>
+        <p:spPr>
+          <a:xfrm>
+            <a:off x="2697939" y="2797366"/>
+            <a:ext cx="1166327" cy="276999"/>
+          </a:xfrm>
+          <a:prstGeom prst="rect">
+            <a:avLst/>
+          </a:prstGeom>
+          <a:noFill/>
+        </p:spPr>
+        <p:txBody>
+          <a:bodyPr wrap="square" rtlCol="0">
+            <a:spAutoFit/>
+          </a:bodyPr>
+          <a:lstStyle/>
+          <a:p>
+            <a:r>
+              <a:rPr lang="de-AT" sz="1200" dirty="0">
+                <a:latin typeface="DejaVu Sans"/>
+              </a:rPr>
+              <a:t>uphill2</a:t>
+            </a:r>
+          </a:p>
+        </p:txBody>
+      </p:sp>
+      <p:sp>
+        <p:nvSpPr>
+          <p:cNvPr id="8" name="Textfeld 7">
+            <a:extLst>
+              <a:ext uri="{FF2B5EF4-FFF2-40B4-BE49-F238E27FC236}">
+                <a16:creationId xmlns:a16="http://schemas.microsoft.com/office/drawing/2014/main" id="{A1270D32-655B-4141-873F-984FBB3142B2}"/>
+              </a:ext>
+            </a:extLst>
+          </p:cNvPr>
+          <p:cNvSpPr txBox="1"/>
+          <p:nvPr/>
+        </p:nvSpPr>
+        <p:spPr>
+          <a:xfrm>
+            <a:off x="3534583" y="2327967"/>
+            <a:ext cx="1166327" cy="276999"/>
+          </a:xfrm>
+          <a:prstGeom prst="rect">
+            <a:avLst/>
+          </a:prstGeom>
+          <a:noFill/>
+        </p:spPr>
+        <p:txBody>
+          <a:bodyPr wrap="square" rtlCol="0">
+            <a:spAutoFit/>
+          </a:bodyPr>
+          <a:lstStyle/>
+          <a:p>
+            <a:r>
+              <a:rPr lang="de-AT" sz="1200" dirty="0">
+                <a:latin typeface="DejaVu Sans"/>
+              </a:rPr>
+              <a:t>down2</a:t>
+            </a:r>
+          </a:p>
+        </p:txBody>
+      </p:sp>
+      <p:sp>
+        <p:nvSpPr>
+          <p:cNvPr id="9" name="Textfeld 8">
+            <a:extLst>
+              <a:ext uri="{FF2B5EF4-FFF2-40B4-BE49-F238E27FC236}">
+                <a16:creationId xmlns:a16="http://schemas.microsoft.com/office/drawing/2014/main" id="{6EEC0829-EF48-4D60-B6BF-73EA0342B29F}"/>
+              </a:ext>
+            </a:extLst>
+          </p:cNvPr>
+          <p:cNvSpPr txBox="1"/>
+          <p:nvPr/>
+        </p:nvSpPr>
+        <p:spPr>
+          <a:xfrm>
+            <a:off x="4826875" y="1753842"/>
+            <a:ext cx="1166327" cy="276999"/>
+          </a:xfrm>
+          <a:prstGeom prst="rect">
+            <a:avLst/>
+          </a:prstGeom>
+          <a:noFill/>
+        </p:spPr>
+        <p:txBody>
+          <a:bodyPr wrap="square" rtlCol="0">
+            <a:spAutoFit/>
+          </a:bodyPr>
+          <a:lstStyle/>
+          <a:p>
+            <a:r>
+              <a:rPr lang="de-AT" sz="1200" dirty="0">
+                <a:latin typeface="DejaVu Sans"/>
+              </a:rPr>
+              <a:t>flat2</a:t>
+            </a:r>
+          </a:p>
+        </p:txBody>
+      </p:sp>
+      <p:grpSp>
+        <p:nvGrpSpPr>
+          <p:cNvPr id="20" name="Gruppieren 19">
+            <a:extLst>
+              <a:ext uri="{FF2B5EF4-FFF2-40B4-BE49-F238E27FC236}">
+                <a16:creationId xmlns:a16="http://schemas.microsoft.com/office/drawing/2014/main" id="{57F4423D-DF98-4657-A0B9-E9D223647094}"/>
+              </a:ext>
+            </a:extLst>
+          </p:cNvPr>
+          <p:cNvGrpSpPr/>
+          <p:nvPr/>
+        </p:nvGrpSpPr>
+        <p:grpSpPr>
+          <a:xfrm>
+            <a:off x="7189605" y="1572742"/>
+            <a:ext cx="6236582" cy="3789316"/>
+            <a:chOff x="7189605" y="1572742"/>
+            <a:chExt cx="6236582" cy="3789316"/>
+          </a:xfrm>
+        </p:grpSpPr>
+        <p:pic>
+          <p:nvPicPr>
+            <p:cNvPr id="12" name="Grafik 11" descr="Ein Bild, das Diagramm enthält.&#10;&#10;Automatisch generierte Beschreibung">
+              <a:extLst>
+                <a:ext uri="{FF2B5EF4-FFF2-40B4-BE49-F238E27FC236}">
+                  <a16:creationId xmlns:a16="http://schemas.microsoft.com/office/drawing/2014/main" id="{F16B5FA7-0306-4712-8AA5-26E6E4004CA7}"/>
+                </a:ext>
+              </a:extLst>
+            </p:cNvPr>
+            <p:cNvPicPr>
+              <a:picLocks noChangeAspect="1"/>
+            </p:cNvPicPr>
+            <p:nvPr/>
+          </p:nvPicPr>
+          <p:blipFill>
+            <a:blip r:embed="rId3">
+              <a:extLst>
+                <a:ext uri="{28A0092B-C50C-407E-A947-70E740481C1C}">
+                  <a14:useLocalDpi xmlns:a14="http://schemas.microsoft.com/office/drawing/2010/main" val="0"/>
+                </a:ext>
+              </a:extLst>
+            </a:blip>
+            <a:stretch>
+              <a:fillRect/>
+            </a:stretch>
+          </p:blipFill>
+          <p:spPr>
+            <a:xfrm>
+              <a:off x="7189605" y="1572742"/>
+              <a:ext cx="6236582" cy="3789316"/>
+            </a:xfrm>
+            <a:prstGeom prst="rect">
+              <a:avLst/>
+            </a:prstGeom>
+          </p:spPr>
+        </p:pic>
+        <p:sp>
+          <p:nvSpPr>
+            <p:cNvPr id="13" name="Textfeld 12">
+              <a:extLst>
+                <a:ext uri="{FF2B5EF4-FFF2-40B4-BE49-F238E27FC236}">
+                  <a16:creationId xmlns:a16="http://schemas.microsoft.com/office/drawing/2014/main" id="{897C361E-4A37-4350-A1BA-E3870E7919B2}"/>
+                </a:ext>
+              </a:extLst>
+            </p:cNvPr>
+            <p:cNvSpPr txBox="1"/>
+            <p:nvPr/>
+          </p:nvSpPr>
+          <p:spPr>
+            <a:xfrm>
+              <a:off x="11365735" y="3333090"/>
+              <a:ext cx="1166327" cy="276999"/>
+            </a:xfrm>
+            <a:prstGeom prst="rect">
+              <a:avLst/>
+            </a:prstGeom>
+            <a:noFill/>
+          </p:spPr>
+          <p:txBody>
+            <a:bodyPr wrap="square" rtlCol="0">
+              <a:spAutoFit/>
+            </a:bodyPr>
+            <a:lstStyle/>
+            <a:p>
+              <a:r>
+                <a:rPr lang="de-AT" sz="1200" dirty="0">
+                  <a:latin typeface="DejaVu Sans"/>
+                </a:rPr>
+                <a:t>flat1</a:t>
+              </a:r>
+            </a:p>
+          </p:txBody>
+        </p:sp>
+        <p:sp>
+          <p:nvSpPr>
+            <p:cNvPr id="14" name="Textfeld 13">
+              <a:extLst>
+                <a:ext uri="{FF2B5EF4-FFF2-40B4-BE49-F238E27FC236}">
+                  <a16:creationId xmlns:a16="http://schemas.microsoft.com/office/drawing/2014/main" id="{16C82EB7-3DE9-4B0C-A9CE-6E1954D30FAA}"/>
+                </a:ext>
+              </a:extLst>
+            </p:cNvPr>
+            <p:cNvSpPr txBox="1"/>
+            <p:nvPr/>
+          </p:nvSpPr>
+          <p:spPr>
+            <a:xfrm>
+              <a:off x="9724732" y="4063988"/>
+              <a:ext cx="1166327" cy="276999"/>
+            </a:xfrm>
+            <a:prstGeom prst="rect">
+              <a:avLst/>
+            </a:prstGeom>
+            <a:noFill/>
+          </p:spPr>
+          <p:txBody>
+            <a:bodyPr wrap="square" rtlCol="0">
+              <a:spAutoFit/>
+            </a:bodyPr>
+            <a:lstStyle/>
+            <a:p>
+              <a:r>
+                <a:rPr lang="de-AT" sz="1200" dirty="0">
+                  <a:latin typeface="DejaVu Sans"/>
+                </a:rPr>
+                <a:t>uphill1</a:t>
+              </a:r>
+            </a:p>
+          </p:txBody>
+        </p:sp>
+        <p:sp>
+          <p:nvSpPr>
+            <p:cNvPr id="15" name="Textfeld 14">
+              <a:extLst>
+                <a:ext uri="{FF2B5EF4-FFF2-40B4-BE49-F238E27FC236}">
+                  <a16:creationId xmlns:a16="http://schemas.microsoft.com/office/drawing/2014/main" id="{FF4DFD2B-01E1-465F-8FEB-0A5D116C88EE}"/>
+                </a:ext>
+              </a:extLst>
+            </p:cNvPr>
+            <p:cNvSpPr txBox="1"/>
+            <p:nvPr/>
+          </p:nvSpPr>
+          <p:spPr>
+            <a:xfrm>
+              <a:off x="9129498" y="4343710"/>
+              <a:ext cx="1166327" cy="276999"/>
+            </a:xfrm>
+            <a:prstGeom prst="rect">
+              <a:avLst/>
+            </a:prstGeom>
+            <a:noFill/>
+          </p:spPr>
+          <p:txBody>
+            <a:bodyPr wrap="square" rtlCol="0">
+              <a:spAutoFit/>
+            </a:bodyPr>
+            <a:lstStyle/>
+            <a:p>
+              <a:r>
+                <a:rPr lang="de-AT" sz="1200" dirty="0">
+                  <a:latin typeface="DejaVu Sans"/>
+                </a:rPr>
+                <a:t>down1</a:t>
+              </a:r>
+            </a:p>
+          </p:txBody>
+        </p:sp>
+        <p:sp>
+          <p:nvSpPr>
+            <p:cNvPr id="16" name="Textfeld 15">
+              <a:extLst>
+                <a:ext uri="{FF2B5EF4-FFF2-40B4-BE49-F238E27FC236}">
+                  <a16:creationId xmlns:a16="http://schemas.microsoft.com/office/drawing/2014/main" id="{2D65D239-7E54-41F0-8F26-9FB5A4EDB254}"/>
+                </a:ext>
+              </a:extLst>
+            </p:cNvPr>
+            <p:cNvSpPr txBox="1"/>
+            <p:nvPr/>
+          </p:nvSpPr>
+          <p:spPr>
+            <a:xfrm>
+              <a:off x="8101575" y="4340987"/>
+              <a:ext cx="1166327" cy="276999"/>
+            </a:xfrm>
+            <a:prstGeom prst="rect">
+              <a:avLst/>
+            </a:prstGeom>
+            <a:noFill/>
+          </p:spPr>
+          <p:txBody>
+            <a:bodyPr wrap="square" rtlCol="0">
+              <a:spAutoFit/>
+            </a:bodyPr>
+            <a:lstStyle/>
+            <a:p>
+              <a:r>
+                <a:rPr lang="de-AT" sz="1200" dirty="0">
+                  <a:latin typeface="DejaVu Sans"/>
+                </a:rPr>
+                <a:t>turn</a:t>
+              </a:r>
+            </a:p>
+          </p:txBody>
+        </p:sp>
+        <p:sp>
+          <p:nvSpPr>
+            <p:cNvPr id="17" name="Textfeld 16">
+              <a:extLst>
+                <a:ext uri="{FF2B5EF4-FFF2-40B4-BE49-F238E27FC236}">
+                  <a16:creationId xmlns:a16="http://schemas.microsoft.com/office/drawing/2014/main" id="{83AAAF07-5D86-47A5-AE55-D3A0AED688F2}"/>
+                </a:ext>
+              </a:extLst>
+            </p:cNvPr>
+            <p:cNvSpPr txBox="1"/>
+            <p:nvPr/>
+          </p:nvSpPr>
+          <p:spPr>
+            <a:xfrm>
+              <a:off x="8119194" y="3515229"/>
+              <a:ext cx="1166327" cy="276999"/>
+            </a:xfrm>
+            <a:prstGeom prst="rect">
+              <a:avLst/>
+            </a:prstGeom>
+            <a:noFill/>
+          </p:spPr>
+          <p:txBody>
+            <a:bodyPr wrap="square" rtlCol="0">
+              <a:spAutoFit/>
+            </a:bodyPr>
+            <a:lstStyle/>
+            <a:p>
+              <a:r>
+                <a:rPr lang="de-AT" sz="1200" dirty="0">
+                  <a:latin typeface="DejaVu Sans"/>
+                </a:rPr>
+                <a:t>uphill2</a:t>
+              </a:r>
+            </a:p>
+          </p:txBody>
+        </p:sp>
+        <p:sp>
+          <p:nvSpPr>
+            <p:cNvPr id="18" name="Textfeld 17">
+              <a:extLst>
+                <a:ext uri="{FF2B5EF4-FFF2-40B4-BE49-F238E27FC236}">
+                  <a16:creationId xmlns:a16="http://schemas.microsoft.com/office/drawing/2014/main" id="{BA55ECD0-82A0-45DB-B0CF-7A3BAEEEEBD4}"/>
+                </a:ext>
+              </a:extLst>
+            </p:cNvPr>
+            <p:cNvSpPr txBox="1"/>
+            <p:nvPr/>
+          </p:nvSpPr>
+          <p:spPr>
+            <a:xfrm>
+              <a:off x="8953769" y="3078717"/>
+              <a:ext cx="1166327" cy="276999"/>
+            </a:xfrm>
+            <a:prstGeom prst="rect">
+              <a:avLst/>
+            </a:prstGeom>
+            <a:noFill/>
+          </p:spPr>
+          <p:txBody>
+            <a:bodyPr wrap="square" rtlCol="0">
+              <a:spAutoFit/>
+            </a:bodyPr>
+            <a:lstStyle/>
+            <a:p>
+              <a:r>
+                <a:rPr lang="de-AT" sz="1200" dirty="0">
+                  <a:latin typeface="DejaVu Sans"/>
+                </a:rPr>
+                <a:t>down2</a:t>
+              </a:r>
+            </a:p>
+          </p:txBody>
+        </p:sp>
+        <p:sp>
+          <p:nvSpPr>
+            <p:cNvPr id="19" name="Textfeld 18">
+              <a:extLst>
+                <a:ext uri="{FF2B5EF4-FFF2-40B4-BE49-F238E27FC236}">
+                  <a16:creationId xmlns:a16="http://schemas.microsoft.com/office/drawing/2014/main" id="{750C43A6-1A17-4A22-81EC-BA55D92B00FA}"/>
+                </a:ext>
+              </a:extLst>
+            </p:cNvPr>
+            <p:cNvSpPr txBox="1"/>
+            <p:nvPr/>
+          </p:nvSpPr>
+          <p:spPr>
+            <a:xfrm>
+              <a:off x="10295825" y="2466466"/>
+              <a:ext cx="1166327" cy="276999"/>
+            </a:xfrm>
+            <a:prstGeom prst="rect">
+              <a:avLst/>
+            </a:prstGeom>
+            <a:noFill/>
+          </p:spPr>
+          <p:txBody>
+            <a:bodyPr wrap="square" rtlCol="0">
+              <a:spAutoFit/>
+            </a:bodyPr>
+            <a:lstStyle/>
+            <a:p>
+              <a:r>
+                <a:rPr lang="de-AT" sz="1200" dirty="0">
+                  <a:latin typeface="DejaVu Sans"/>
+                </a:rPr>
+                <a:t>flat2</a:t>
+              </a:r>
+            </a:p>
+          </p:txBody>
+        </p:sp>
+      </p:grpSp>
+    </p:spTree>
+    <p:extLst>
+      <p:ext uri="{BB962C8B-B14F-4D97-AF65-F5344CB8AC3E}">
+        <p14:creationId xmlns:p14="http://schemas.microsoft.com/office/powerpoint/2010/main" val="2986862466"/>
+      </p:ext>
+    </p:extLst>
+  </p:cSld>
+  <p:clrMapOvr>
+    <a:masterClrMapping/>
+  </p:clrMapOvr>
+</p:sld>
+</file>
+
+<file path=ppt/slides/slide12.xml><?xml version="1.0" encoding="utf-8"?>
+<p:sld xmlns:a="http://schemas.openxmlformats.org/drawingml/2006/main" xmlns:r="http://schemas.openxmlformats.org/officeDocument/2006/relationships" xmlns:p="http://schemas.openxmlformats.org/presentationml/2006/main">
+  <p:cSld>
+    <p:spTree>
+      <p:nvGrpSpPr>
+        <p:cNvPr id="1" name=""/>
+        <p:cNvGrpSpPr/>
+        <p:nvPr/>
+      </p:nvGrpSpPr>
+      <p:grpSpPr>
+        <a:xfrm>
+          <a:off x="0" y="0"/>
+          <a:ext cx="0" cy="0"/>
+          <a:chOff x="0" y="0"/>
+          <a:chExt cx="0" cy="0"/>
+        </a:xfrm>
+      </p:grpSpPr>
       <p:pic>
         <p:nvPicPr>
           <p:cNvPr id="3" name="Grafik 2">
@@ -1409,7 +2457,67 @@
 </p:sld>
 </file>
 
-<file path=ppt/slides/slide11.xml><?xml version="1.0" encoding="utf-8"?>
+<file path=ppt/slides/slide13.xml><?xml version="1.0" encoding="utf-8"?>
+<p:sld xmlns:a="http://schemas.openxmlformats.org/drawingml/2006/main" xmlns:r="http://schemas.openxmlformats.org/officeDocument/2006/relationships" xmlns:p="http://schemas.openxmlformats.org/presentationml/2006/main">
+  <p:cSld>
+    <p:spTree>
+      <p:nvGrpSpPr>
+        <p:cNvPr id="1" name=""/>
+        <p:cNvGrpSpPr/>
+        <p:nvPr/>
+      </p:nvGrpSpPr>
+      <p:grpSpPr>
+        <a:xfrm>
+          <a:off x="0" y="0"/>
+          <a:ext cx="0" cy="0"/>
+          <a:chOff x="0" y="0"/>
+          <a:chExt cx="0" cy="0"/>
+        </a:xfrm>
+      </p:grpSpPr>
+      <p:pic>
+        <p:nvPicPr>
+          <p:cNvPr id="4" name="Grafik 3">
+            <a:extLst>
+              <a:ext uri="{FF2B5EF4-FFF2-40B4-BE49-F238E27FC236}">
+                <a16:creationId xmlns:a16="http://schemas.microsoft.com/office/drawing/2014/main" id="{3EB0655C-327E-498E-8767-71229602701B}"/>
+              </a:ext>
+            </a:extLst>
+          </p:cNvPr>
+          <p:cNvPicPr>
+            <a:picLocks noChangeAspect="1"/>
+          </p:cNvPicPr>
+          <p:nvPr/>
+        </p:nvPicPr>
+        <p:blipFill>
+          <a:blip r:embed="rId2"/>
+          <a:stretch>
+            <a:fillRect/>
+          </a:stretch>
+        </p:blipFill>
+        <p:spPr>
+          <a:xfrm>
+            <a:off x="2977625" y="1532979"/>
+            <a:ext cx="6236749" cy="3792041"/>
+          </a:xfrm>
+          <a:prstGeom prst="rect">
+            <a:avLst/>
+          </a:prstGeom>
+        </p:spPr>
+      </p:pic>
+    </p:spTree>
+    <p:extLst>
+      <p:ext uri="{BB962C8B-B14F-4D97-AF65-F5344CB8AC3E}">
+        <p14:creationId xmlns:p14="http://schemas.microsoft.com/office/powerpoint/2010/main" val="1836690398"/>
+      </p:ext>
+    </p:extLst>
+  </p:cSld>
+  <p:clrMapOvr>
+    <a:masterClrMapping/>
+  </p:clrMapOvr>
+</p:sld>
+</file>
+
+<file path=ppt/slides/slide14.xml><?xml version="1.0" encoding="utf-8"?>
 <p:sld xmlns:a="http://schemas.openxmlformats.org/drawingml/2006/main" xmlns:r="http://schemas.openxmlformats.org/officeDocument/2006/relationships" xmlns:p="http://schemas.openxmlformats.org/presentationml/2006/main">
   <p:cSld>
     <p:spTree>
@@ -1468,7 +2576,7 @@
 </p:sld>
 </file>
 
-<file path=ppt/slides/slide12.xml><?xml version="1.0" encoding="utf-8"?>
+<file path=ppt/slides/slide15.xml><?xml version="1.0" encoding="utf-8"?>
 <p:sld xmlns:a="http://schemas.openxmlformats.org/drawingml/2006/main" xmlns:r="http://schemas.openxmlformats.org/officeDocument/2006/relationships" xmlns:p="http://schemas.openxmlformats.org/presentationml/2006/main">
   <p:cSld>
     <p:spTree>
@@ -1527,7 +2635,7 @@
 </p:sld>
 </file>
 
-<file path=ppt/slides/slide13.xml><?xml version="1.0" encoding="utf-8"?>
+<file path=ppt/slides/slide16.xml><?xml version="1.0" encoding="utf-8"?>
 <p:sld xmlns:a="http://schemas.openxmlformats.org/drawingml/2006/main" xmlns:r="http://schemas.openxmlformats.org/officeDocument/2006/relationships" xmlns:p="http://schemas.openxmlformats.org/presentationml/2006/main">
   <p:cSld>
     <p:spTree>
@@ -1586,7 +2694,7 @@
 </p:sld>
 </file>
 
-<file path=ppt/slides/slide14.xml><?xml version="1.0" encoding="utf-8"?>
+<file path=ppt/slides/slide17.xml><?xml version="1.0" encoding="utf-8"?>
 <p:sld xmlns:a="http://schemas.openxmlformats.org/drawingml/2006/main" xmlns:r="http://schemas.openxmlformats.org/officeDocument/2006/relationships" xmlns:p="http://schemas.openxmlformats.org/presentationml/2006/main">
   <p:cSld>
     <p:spTree>
@@ -1616,7 +2724,7 @@
 </p:sld>
 </file>
 
-<file path=ppt/slides/slide15.xml><?xml version="1.0" encoding="utf-8"?>
+<file path=ppt/slides/slide18.xml><?xml version="1.0" encoding="utf-8"?>
 <p:sld xmlns:a="http://schemas.openxmlformats.org/drawingml/2006/main" xmlns:r="http://schemas.openxmlformats.org/officeDocument/2006/relationships" xmlns:p="http://schemas.openxmlformats.org/presentationml/2006/main">
   <p:cSld>
     <p:spTree>
@@ -1646,7 +2754,7 @@
 </p:sld>
 </file>
 
-<file path=ppt/slides/slide16.xml><?xml version="1.0" encoding="utf-8"?>
+<file path=ppt/slides/slide19.xml><?xml version="1.0" encoding="utf-8"?>
 <p:sld xmlns:a="http://schemas.openxmlformats.org/drawingml/2006/main" xmlns:r="http://schemas.openxmlformats.org/officeDocument/2006/relationships" xmlns:p="http://schemas.openxmlformats.org/presentationml/2006/main">
   <p:cSld>
     <p:spTree>
@@ -1676,96 +2784,6 @@
 </p:sld>
 </file>
 
-<file path=ppt/slides/slide17.xml><?xml version="1.0" encoding="utf-8"?>
-<p:sld xmlns:a="http://schemas.openxmlformats.org/drawingml/2006/main" xmlns:r="http://schemas.openxmlformats.org/officeDocument/2006/relationships" xmlns:p="http://schemas.openxmlformats.org/presentationml/2006/main">
-  <p:cSld>
-    <p:spTree>
-      <p:nvGrpSpPr>
-        <p:cNvPr id="1" name=""/>
-        <p:cNvGrpSpPr/>
-        <p:nvPr/>
-      </p:nvGrpSpPr>
-      <p:grpSpPr>
-        <a:xfrm>
-          <a:off x="0" y="0"/>
-          <a:ext cx="0" cy="0"/>
-          <a:chOff x="0" y="0"/>
-          <a:chExt cx="0" cy="0"/>
-        </a:xfrm>
-      </p:grpSpPr>
-    </p:spTree>
-    <p:extLst>
-      <p:ext uri="{BB962C8B-B14F-4D97-AF65-F5344CB8AC3E}">
-        <p14:creationId xmlns:p14="http://schemas.microsoft.com/office/powerpoint/2010/main" val="1176997939"/>
-      </p:ext>
-    </p:extLst>
-  </p:cSld>
-  <p:clrMapOvr>
-    <a:masterClrMapping/>
-  </p:clrMapOvr>
-</p:sld>
-</file>
-
-<file path=ppt/slides/slide18.xml><?xml version="1.0" encoding="utf-8"?>
-<p:sld xmlns:a="http://schemas.openxmlformats.org/drawingml/2006/main" xmlns:r="http://schemas.openxmlformats.org/officeDocument/2006/relationships" xmlns:p="http://schemas.openxmlformats.org/presentationml/2006/main">
-  <p:cSld>
-    <p:spTree>
-      <p:nvGrpSpPr>
-        <p:cNvPr id="1" name=""/>
-        <p:cNvGrpSpPr/>
-        <p:nvPr/>
-      </p:nvGrpSpPr>
-      <p:grpSpPr>
-        <a:xfrm>
-          <a:off x="0" y="0"/>
-          <a:ext cx="0" cy="0"/>
-          <a:chOff x="0" y="0"/>
-          <a:chExt cx="0" cy="0"/>
-        </a:xfrm>
-      </p:grpSpPr>
-    </p:spTree>
-    <p:extLst>
-      <p:ext uri="{BB962C8B-B14F-4D97-AF65-F5344CB8AC3E}">
-        <p14:creationId xmlns:p14="http://schemas.microsoft.com/office/powerpoint/2010/main" val="3454752388"/>
-      </p:ext>
-    </p:extLst>
-  </p:cSld>
-  <p:clrMapOvr>
-    <a:masterClrMapping/>
-  </p:clrMapOvr>
-</p:sld>
-</file>
-
-<file path=ppt/slides/slide19.xml><?xml version="1.0" encoding="utf-8"?>
-<p:sld xmlns:a="http://schemas.openxmlformats.org/drawingml/2006/main" xmlns:r="http://schemas.openxmlformats.org/officeDocument/2006/relationships" xmlns:p="http://schemas.openxmlformats.org/presentationml/2006/main">
-  <p:cSld>
-    <p:spTree>
-      <p:nvGrpSpPr>
-        <p:cNvPr id="1" name=""/>
-        <p:cNvGrpSpPr/>
-        <p:nvPr/>
-      </p:nvGrpSpPr>
-      <p:grpSpPr>
-        <a:xfrm>
-          <a:off x="0" y="0"/>
-          <a:ext cx="0" cy="0"/>
-          <a:chOff x="0" y="0"/>
-          <a:chExt cx="0" cy="0"/>
-        </a:xfrm>
-      </p:grpSpPr>
-    </p:spTree>
-    <p:extLst>
-      <p:ext uri="{BB962C8B-B14F-4D97-AF65-F5344CB8AC3E}">
-        <p14:creationId xmlns:p14="http://schemas.microsoft.com/office/powerpoint/2010/main" val="1632065799"/>
-      </p:ext>
-    </p:extLst>
-  </p:cSld>
-  <p:clrMapOvr>
-    <a:masterClrMapping/>
-  </p:clrMapOvr>
-</p:sld>
-</file>
-
 <file path=ppt/slides/slide2.xml><?xml version="1.0" encoding="utf-8"?>
 <p:sld xmlns:a="http://schemas.openxmlformats.org/drawingml/2006/main" xmlns:r="http://schemas.openxmlformats.org/officeDocument/2006/relationships" xmlns:p="http://schemas.openxmlformats.org/presentationml/2006/main">
   <p:cSld>
@@ -1785,10 +2803,10 @@
       </p:grpSpPr>
       <p:grpSp>
         <p:nvGrpSpPr>
-          <p:cNvPr id="14" name="Gruppieren 13">
+          <p:cNvPr id="2" name="Gruppieren 1">
             <a:extLst>
               <a:ext uri="{FF2B5EF4-FFF2-40B4-BE49-F238E27FC236}">
-                <a16:creationId xmlns:a16="http://schemas.microsoft.com/office/drawing/2014/main" id="{D7CE7965-E818-4A56-805F-A6B28169554C}"/>
+                <a16:creationId xmlns:a16="http://schemas.microsoft.com/office/drawing/2014/main" id="{2A55092A-C627-41E1-9739-911B9960807E}"/>
               </a:ext>
             </a:extLst>
           </p:cNvPr>
@@ -1803,12 +2821,169 @@
             <a:chExt cx="8420100" cy="3486150"/>
           </a:xfrm>
         </p:grpSpPr>
+        <p:grpSp>
+          <p:nvGrpSpPr>
+            <p:cNvPr id="14" name="Gruppieren 13">
+              <a:extLst>
+                <a:ext uri="{FF2B5EF4-FFF2-40B4-BE49-F238E27FC236}">
+                  <a16:creationId xmlns:a16="http://schemas.microsoft.com/office/drawing/2014/main" id="{D7CE7965-E818-4A56-805F-A6B28169554C}"/>
+                </a:ext>
+              </a:extLst>
+            </p:cNvPr>
+            <p:cNvGrpSpPr/>
+            <p:nvPr/>
+          </p:nvGrpSpPr>
+          <p:grpSpPr>
+            <a:xfrm>
+              <a:off x="2005379" y="1513987"/>
+              <a:ext cx="8420100" cy="3486150"/>
+              <a:chOff x="2005379" y="1513987"/>
+              <a:chExt cx="8420100" cy="3486150"/>
+            </a:xfrm>
+          </p:grpSpPr>
+          <p:pic>
+            <p:nvPicPr>
+              <p:cNvPr id="10" name="Grafik 9">
+                <a:extLst>
+                  <a:ext uri="{FF2B5EF4-FFF2-40B4-BE49-F238E27FC236}">
+                    <a16:creationId xmlns:a16="http://schemas.microsoft.com/office/drawing/2014/main" id="{3F3E8421-83CE-436E-A713-F579A3E63E53}"/>
+                  </a:ext>
+                </a:extLst>
+              </p:cNvPr>
+              <p:cNvPicPr>
+                <a:picLocks noChangeAspect="1"/>
+              </p:cNvPicPr>
+              <p:nvPr/>
+            </p:nvPicPr>
+            <p:blipFill>
+              <a:blip r:embed="rId2"/>
+              <a:stretch>
+                <a:fillRect/>
+              </a:stretch>
+            </p:blipFill>
+            <p:spPr>
+              <a:xfrm>
+                <a:off x="5872529" y="1513987"/>
+                <a:ext cx="4552950" cy="3486150"/>
+              </a:xfrm>
+              <a:prstGeom prst="rect">
+                <a:avLst/>
+              </a:prstGeom>
+            </p:spPr>
+          </p:pic>
+          <p:pic>
+            <p:nvPicPr>
+              <p:cNvPr id="11" name="Grafik 10">
+                <a:extLst>
+                  <a:ext uri="{FF2B5EF4-FFF2-40B4-BE49-F238E27FC236}">
+                    <a16:creationId xmlns:a16="http://schemas.microsoft.com/office/drawing/2014/main" id="{0BF88B50-3881-48C0-AA5A-23A49C32466C}"/>
+                  </a:ext>
+                </a:extLst>
+              </p:cNvPr>
+              <p:cNvPicPr>
+                <a:picLocks noChangeAspect="1"/>
+              </p:cNvPicPr>
+              <p:nvPr/>
+            </p:nvPicPr>
+            <p:blipFill>
+              <a:blip r:embed="rId3"/>
+              <a:stretch>
+                <a:fillRect/>
+              </a:stretch>
+            </p:blipFill>
+            <p:spPr>
+              <a:xfrm>
+                <a:off x="2005379" y="1513987"/>
+                <a:ext cx="3867150" cy="3486150"/>
+              </a:xfrm>
+              <a:prstGeom prst="rect">
+                <a:avLst/>
+              </a:prstGeom>
+            </p:spPr>
+          </p:pic>
+          <p:sp>
+            <p:nvSpPr>
+              <p:cNvPr id="12" name="Textfeld 11">
+                <a:extLst>
+                  <a:ext uri="{FF2B5EF4-FFF2-40B4-BE49-F238E27FC236}">
+                    <a16:creationId xmlns:a16="http://schemas.microsoft.com/office/drawing/2014/main" id="{15CFB017-D8EE-45E7-B4AB-7B65C3823698}"/>
+                  </a:ext>
+                </a:extLst>
+              </p:cNvPr>
+              <p:cNvSpPr txBox="1"/>
+              <p:nvPr/>
+            </p:nvSpPr>
+            <p:spPr>
+              <a:xfrm>
+                <a:off x="2005379" y="1513987"/>
+                <a:ext cx="508000" cy="369332"/>
+              </a:xfrm>
+              <a:prstGeom prst="rect">
+                <a:avLst/>
+              </a:prstGeom>
+              <a:noFill/>
+            </p:spPr>
+            <p:txBody>
+              <a:bodyPr wrap="square" rtlCol="0">
+                <a:spAutoFit/>
+              </a:bodyPr>
+              <a:lstStyle/>
+              <a:p>
+                <a:r>
+                  <a:rPr lang="de-AT" dirty="0">
+                    <a:latin typeface="Times New Roman" panose="02020603050405020304" pitchFamily="18" charset="0"/>
+                    <a:cs typeface="Times New Roman" panose="02020603050405020304" pitchFamily="18" charset="0"/>
+                  </a:rPr>
+                  <a:t>a)</a:t>
+                </a:r>
+              </a:p>
+            </p:txBody>
+          </p:sp>
+          <p:sp>
+            <p:nvSpPr>
+              <p:cNvPr id="13" name="Textfeld 12">
+                <a:extLst>
+                  <a:ext uri="{FF2B5EF4-FFF2-40B4-BE49-F238E27FC236}">
+                    <a16:creationId xmlns:a16="http://schemas.microsoft.com/office/drawing/2014/main" id="{4D7D2E33-0EDD-4628-9628-CE2E79CAB21B}"/>
+                  </a:ext>
+                </a:extLst>
+              </p:cNvPr>
+              <p:cNvSpPr txBox="1"/>
+              <p:nvPr/>
+            </p:nvSpPr>
+            <p:spPr>
+              <a:xfrm>
+                <a:off x="5698149" y="1513987"/>
+                <a:ext cx="508000" cy="369332"/>
+              </a:xfrm>
+              <a:prstGeom prst="rect">
+                <a:avLst/>
+              </a:prstGeom>
+              <a:noFill/>
+            </p:spPr>
+            <p:txBody>
+              <a:bodyPr wrap="square" rtlCol="0">
+                <a:spAutoFit/>
+              </a:bodyPr>
+              <a:lstStyle/>
+              <a:p>
+                <a:r>
+                  <a:rPr lang="de-AT" dirty="0">
+                    <a:latin typeface="Times New Roman" panose="02020603050405020304" pitchFamily="18" charset="0"/>
+                    <a:cs typeface="Times New Roman" panose="02020603050405020304" pitchFamily="18" charset="0"/>
+                  </a:rPr>
+                  <a:t>b)</a:t>
+                </a:r>
+              </a:p>
+            </p:txBody>
+          </p:sp>
+        </p:grpSp>
         <p:pic>
           <p:nvPicPr>
-            <p:cNvPr id="10" name="Grafik 9">
+            <p:cNvPr id="7" name="Grafik 6" descr="Ein Bild, das Diagramm enthält.&#10;&#10;Automatisch generierte Beschreibung">
               <a:extLst>
                 <a:ext uri="{FF2B5EF4-FFF2-40B4-BE49-F238E27FC236}">
-                  <a16:creationId xmlns:a16="http://schemas.microsoft.com/office/drawing/2014/main" id="{3F3E8421-83CE-436E-A713-F579A3E63E53}"/>
+                  <a16:creationId xmlns:a16="http://schemas.microsoft.com/office/drawing/2014/main" id="{A10C9863-1D33-4505-B78C-759A2F052F0B}"/>
                 </a:ext>
               </a:extLst>
             </p:cNvPr>
@@ -1817,16 +2992,21 @@
             </p:cNvPicPr>
             <p:nvPr/>
           </p:nvPicPr>
-          <p:blipFill>
-            <a:blip r:embed="rId2"/>
-            <a:stretch>
-              <a:fillRect/>
-            </a:stretch>
+          <p:blipFill rotWithShape="1">
+            <a:blip r:embed="rId4">
+              <a:extLst>
+                <a:ext uri="{28A0092B-C50C-407E-A947-70E740481C1C}">
+                  <a14:useLocalDpi xmlns:a14="http://schemas.microsoft.com/office/drawing/2010/main" val="0"/>
+                </a:ext>
+              </a:extLst>
+            </a:blip>
+            <a:srcRect r="90494"/>
+            <a:stretch/>
           </p:blipFill>
           <p:spPr>
             <a:xfrm>
-              <a:off x="5872529" y="1513987"/>
-              <a:ext cx="4552950" cy="3486150"/>
+              <a:off x="2066472" y="1563377"/>
+              <a:ext cx="370184" cy="3356109"/>
             </a:xfrm>
             <a:prstGeom prst="rect">
               <a:avLst/>
@@ -1835,10 +3015,10 @@
         </p:pic>
         <p:pic>
           <p:nvPicPr>
-            <p:cNvPr id="11" name="Grafik 10">
+            <p:cNvPr id="8" name="Grafik 7" descr="Ein Bild, das Diagramm enthält.&#10;&#10;Automatisch generierte Beschreibung">
               <a:extLst>
                 <a:ext uri="{FF2B5EF4-FFF2-40B4-BE49-F238E27FC236}">
-                  <a16:creationId xmlns:a16="http://schemas.microsoft.com/office/drawing/2014/main" id="{0BF88B50-3881-48C0-AA5A-23A49C32466C}"/>
+                  <a16:creationId xmlns:a16="http://schemas.microsoft.com/office/drawing/2014/main" id="{25516167-E969-44AA-A82B-315E2BB44BFF}"/>
                 </a:ext>
               </a:extLst>
             </p:cNvPr>
@@ -1847,16 +3027,85 @@
             </p:cNvPicPr>
             <p:nvPr/>
           </p:nvPicPr>
-          <p:blipFill>
-            <a:blip r:embed="rId3"/>
-            <a:stretch>
-              <a:fillRect/>
-            </a:stretch>
+          <p:blipFill rotWithShape="1">
+            <a:blip r:embed="rId4">
+              <a:extLst>
+                <a:ext uri="{28A0092B-C50C-407E-A947-70E740481C1C}">
+                  <a14:useLocalDpi xmlns:a14="http://schemas.microsoft.com/office/drawing/2010/main" val="0"/>
+                </a:ext>
+              </a:extLst>
+            </a:blip>
+            <a:srcRect l="9505" t="92039" r="19249"/>
+            <a:stretch/>
           </p:blipFill>
           <p:spPr>
             <a:xfrm>
-              <a:off x="2005379" y="1513987"/>
-              <a:ext cx="3867150" cy="3486150"/>
+              <a:off x="2436656" y="4640630"/>
+              <a:ext cx="2774460" cy="312615"/>
+            </a:xfrm>
+            <a:prstGeom prst="rect">
+              <a:avLst/>
+            </a:prstGeom>
+          </p:spPr>
+        </p:pic>
+        <p:pic>
+          <p:nvPicPr>
+            <p:cNvPr id="9" name="Grafik 8" descr="Ein Bild, das Diagramm enthält.&#10;&#10;Automatisch generierte Beschreibung">
+              <a:extLst>
+                <a:ext uri="{FF2B5EF4-FFF2-40B4-BE49-F238E27FC236}">
+                  <a16:creationId xmlns:a16="http://schemas.microsoft.com/office/drawing/2014/main" id="{F0132C36-235A-4671-9AB6-74FAB06CFF58}"/>
+                </a:ext>
+              </a:extLst>
+            </p:cNvPr>
+            <p:cNvPicPr>
+              <a:picLocks noChangeAspect="1"/>
+            </p:cNvPicPr>
+            <p:nvPr/>
+          </p:nvPicPr>
+          <p:blipFill rotWithShape="1">
+            <a:blip r:embed="rId4">
+              <a:extLst>
+                <a:ext uri="{28A0092B-C50C-407E-A947-70E740481C1C}">
+                  <a14:useLocalDpi xmlns:a14="http://schemas.microsoft.com/office/drawing/2010/main" val="0"/>
+                </a:ext>
+              </a:extLst>
+            </a:blip>
+            <a:srcRect l="84766" t="31664" r="1587" b="30572"/>
+            <a:stretch/>
+          </p:blipFill>
+          <p:spPr>
+            <a:xfrm>
+              <a:off x="5278563" y="2588846"/>
+              <a:ext cx="531446" cy="1305170"/>
+            </a:xfrm>
+            <a:prstGeom prst="rect">
+              <a:avLst/>
+            </a:prstGeom>
+          </p:spPr>
+        </p:pic>
+        <p:pic>
+          <p:nvPicPr>
+            <p:cNvPr id="20" name="Grafik 19">
+              <a:extLst>
+                <a:ext uri="{FF2B5EF4-FFF2-40B4-BE49-F238E27FC236}">
+                  <a16:creationId xmlns:a16="http://schemas.microsoft.com/office/drawing/2014/main" id="{F97A4161-797C-4509-9071-403D71DBA643}"/>
+                </a:ext>
+              </a:extLst>
+            </p:cNvPr>
+            <p:cNvPicPr>
+              <a:picLocks noChangeAspect="1"/>
+            </p:cNvPicPr>
+            <p:nvPr/>
+          </p:nvPicPr>
+          <p:blipFill rotWithShape="1">
+            <a:blip r:embed="rId3"/>
+            <a:srcRect l="86864" t="35759" r="8627" b="32631"/>
+            <a:stretch/>
+          </p:blipFill>
+          <p:spPr>
+            <a:xfrm>
+              <a:off x="5353538" y="2690446"/>
+              <a:ext cx="185371" cy="1171413"/>
             </a:xfrm>
             <a:prstGeom prst="rect">
               <a:avLst/>
@@ -1865,10 +3114,10 @@
         </p:pic>
         <p:sp>
           <p:nvSpPr>
-            <p:cNvPr id="12" name="Textfeld 11">
+            <p:cNvPr id="21" name="Textfeld 20">
               <a:extLst>
                 <a:ext uri="{FF2B5EF4-FFF2-40B4-BE49-F238E27FC236}">
-                  <a16:creationId xmlns:a16="http://schemas.microsoft.com/office/drawing/2014/main" id="{15CFB017-D8EE-45E7-B4AB-7B65C3823698}"/>
+                  <a16:creationId xmlns:a16="http://schemas.microsoft.com/office/drawing/2014/main" id="{AAA3E893-7E02-4EC2-84EE-F90E364CA56A}"/>
                 </a:ext>
               </a:extLst>
             </p:cNvPr>
@@ -1877,7 +3126,7 @@
           </p:nvSpPr>
           <p:spPr>
             <a:xfrm>
-              <a:off x="2005379" y="1513987"/>
+              <a:off x="2010020" y="1513987"/>
               <a:ext cx="508000" cy="369332"/>
             </a:xfrm>
             <a:prstGeom prst="rect">
@@ -1901,44 +3150,76 @@
             </a:p>
           </p:txBody>
         </p:sp>
-        <p:sp>
-          <p:nvSpPr>
-            <p:cNvPr id="13" name="Textfeld 12">
+        <p:pic>
+          <p:nvPicPr>
+            <p:cNvPr id="22" name="Grafik 21" descr="Ein Bild, das Diagramm enthält.&#10;&#10;Automatisch generierte Beschreibung">
               <a:extLst>
                 <a:ext uri="{FF2B5EF4-FFF2-40B4-BE49-F238E27FC236}">
-                  <a16:creationId xmlns:a16="http://schemas.microsoft.com/office/drawing/2014/main" id="{4D7D2E33-0EDD-4628-9628-CE2E79CAB21B}"/>
+                  <a16:creationId xmlns:a16="http://schemas.microsoft.com/office/drawing/2014/main" id="{3390A770-54BA-4AF6-9BFE-051358849604}"/>
                 </a:ext>
               </a:extLst>
             </p:cNvPr>
-            <p:cNvSpPr txBox="1"/>
+            <p:cNvPicPr>
+              <a:picLocks noChangeAspect="1"/>
+            </p:cNvPicPr>
             <p:nvPr/>
-          </p:nvSpPr>
+          </p:nvPicPr>
+          <p:blipFill rotWithShape="1">
+            <a:blip r:embed="rId5">
+              <a:extLst>
+                <a:ext uri="{28A0092B-C50C-407E-A947-70E740481C1C}">
+                  <a14:useLocalDpi xmlns:a14="http://schemas.microsoft.com/office/drawing/2010/main" val="0"/>
+                </a:ext>
+              </a:extLst>
+            </a:blip>
+            <a:srcRect t="92717"/>
+            <a:stretch/>
+          </p:blipFill>
           <p:spPr>
             <a:xfrm>
-              <a:off x="5698149" y="1513987"/>
-              <a:ext cx="508000" cy="369332"/>
+              <a:off x="5928981" y="4667709"/>
+              <a:ext cx="4473330" cy="267543"/>
             </a:xfrm>
             <a:prstGeom prst="rect">
               <a:avLst/>
             </a:prstGeom>
-            <a:noFill/>
           </p:spPr>
-          <p:txBody>
-            <a:bodyPr wrap="square" rtlCol="0">
-              <a:spAutoFit/>
-            </a:bodyPr>
-            <a:lstStyle/>
-            <a:p>
-              <a:r>
-                <a:rPr lang="de-AT" dirty="0">
-                  <a:latin typeface="Times New Roman" panose="02020603050405020304" pitchFamily="18" charset="0"/>
-                  <a:cs typeface="Times New Roman" panose="02020603050405020304" pitchFamily="18" charset="0"/>
-                </a:rPr>
-                <a:t>b)</a:t>
-              </a:r>
-            </a:p>
-          </p:txBody>
-        </p:sp>
+        </p:pic>
+        <p:pic>
+          <p:nvPicPr>
+            <p:cNvPr id="23" name="Grafik 22" descr="Ein Bild, das Diagramm enthält.&#10;&#10;Automatisch generierte Beschreibung">
+              <a:extLst>
+                <a:ext uri="{FF2B5EF4-FFF2-40B4-BE49-F238E27FC236}">
+                  <a16:creationId xmlns:a16="http://schemas.microsoft.com/office/drawing/2014/main" id="{BAA4ECAC-1CE9-4987-9884-91E64F95E29A}"/>
+                </a:ext>
+              </a:extLst>
+            </p:cNvPr>
+            <p:cNvPicPr>
+              <a:picLocks noChangeAspect="1"/>
+            </p:cNvPicPr>
+            <p:nvPr/>
+          </p:nvPicPr>
+          <p:blipFill rotWithShape="1">
+            <a:blip r:embed="rId5">
+              <a:extLst>
+                <a:ext uri="{28A0092B-C50C-407E-A947-70E740481C1C}">
+                  <a14:useLocalDpi xmlns:a14="http://schemas.microsoft.com/office/drawing/2010/main" val="0"/>
+                </a:ext>
+              </a:extLst>
+            </a:blip>
+            <a:srcRect l="93120" t="28945" r="756" b="22642"/>
+            <a:stretch/>
+          </p:blipFill>
+          <p:spPr>
+            <a:xfrm>
+              <a:off x="10121141" y="2528455"/>
+              <a:ext cx="281170" cy="1673056"/>
+            </a:xfrm>
+            <a:prstGeom prst="rect">
+              <a:avLst/>
+            </a:prstGeom>
+          </p:spPr>
+        </p:pic>
       </p:grpSp>
     </p:spTree>
     <p:extLst>
@@ -1973,6 +3254,96 @@
     </p:spTree>
     <p:extLst>
       <p:ext uri="{BB962C8B-B14F-4D97-AF65-F5344CB8AC3E}">
+        <p14:creationId xmlns:p14="http://schemas.microsoft.com/office/powerpoint/2010/main" val="1176997939"/>
+      </p:ext>
+    </p:extLst>
+  </p:cSld>
+  <p:clrMapOvr>
+    <a:masterClrMapping/>
+  </p:clrMapOvr>
+</p:sld>
+</file>
+
+<file path=ppt/slides/slide21.xml><?xml version="1.0" encoding="utf-8"?>
+<p:sld xmlns:a="http://schemas.openxmlformats.org/drawingml/2006/main" xmlns:r="http://schemas.openxmlformats.org/officeDocument/2006/relationships" xmlns:p="http://schemas.openxmlformats.org/presentationml/2006/main">
+  <p:cSld>
+    <p:spTree>
+      <p:nvGrpSpPr>
+        <p:cNvPr id="1" name=""/>
+        <p:cNvGrpSpPr/>
+        <p:nvPr/>
+      </p:nvGrpSpPr>
+      <p:grpSpPr>
+        <a:xfrm>
+          <a:off x="0" y="0"/>
+          <a:ext cx="0" cy="0"/>
+          <a:chOff x="0" y="0"/>
+          <a:chExt cx="0" cy="0"/>
+        </a:xfrm>
+      </p:grpSpPr>
+    </p:spTree>
+    <p:extLst>
+      <p:ext uri="{BB962C8B-B14F-4D97-AF65-F5344CB8AC3E}">
+        <p14:creationId xmlns:p14="http://schemas.microsoft.com/office/powerpoint/2010/main" val="3454752388"/>
+      </p:ext>
+    </p:extLst>
+  </p:cSld>
+  <p:clrMapOvr>
+    <a:masterClrMapping/>
+  </p:clrMapOvr>
+</p:sld>
+</file>
+
+<file path=ppt/slides/slide22.xml><?xml version="1.0" encoding="utf-8"?>
+<p:sld xmlns:a="http://schemas.openxmlformats.org/drawingml/2006/main" xmlns:r="http://schemas.openxmlformats.org/officeDocument/2006/relationships" xmlns:p="http://schemas.openxmlformats.org/presentationml/2006/main">
+  <p:cSld>
+    <p:spTree>
+      <p:nvGrpSpPr>
+        <p:cNvPr id="1" name=""/>
+        <p:cNvGrpSpPr/>
+        <p:nvPr/>
+      </p:nvGrpSpPr>
+      <p:grpSpPr>
+        <a:xfrm>
+          <a:off x="0" y="0"/>
+          <a:ext cx="0" cy="0"/>
+          <a:chOff x="0" y="0"/>
+          <a:chExt cx="0" cy="0"/>
+        </a:xfrm>
+      </p:grpSpPr>
+    </p:spTree>
+    <p:extLst>
+      <p:ext uri="{BB962C8B-B14F-4D97-AF65-F5344CB8AC3E}">
+        <p14:creationId xmlns:p14="http://schemas.microsoft.com/office/powerpoint/2010/main" val="1632065799"/>
+      </p:ext>
+    </p:extLst>
+  </p:cSld>
+  <p:clrMapOvr>
+    <a:masterClrMapping/>
+  </p:clrMapOvr>
+</p:sld>
+</file>
+
+<file path=ppt/slides/slide23.xml><?xml version="1.0" encoding="utf-8"?>
+<p:sld xmlns:a="http://schemas.openxmlformats.org/drawingml/2006/main" xmlns:r="http://schemas.openxmlformats.org/officeDocument/2006/relationships" xmlns:p="http://schemas.openxmlformats.org/presentationml/2006/main">
+  <p:cSld>
+    <p:spTree>
+      <p:nvGrpSpPr>
+        <p:cNvPr id="1" name=""/>
+        <p:cNvGrpSpPr/>
+        <p:nvPr/>
+      </p:nvGrpSpPr>
+      <p:grpSpPr>
+        <a:xfrm>
+          <a:off x="0" y="0"/>
+          <a:ext cx="0" cy="0"/>
+          <a:chOff x="0" y="0"/>
+          <a:chExt cx="0" cy="0"/>
+        </a:xfrm>
+      </p:grpSpPr>
+    </p:spTree>
+    <p:extLst>
+      <p:ext uri="{BB962C8B-B14F-4D97-AF65-F5344CB8AC3E}">
         <p14:creationId xmlns:p14="http://schemas.microsoft.com/office/powerpoint/2010/main" val="363198386"/>
       </p:ext>
     </p:extLst>
@@ -1983,7 +3354,7 @@
 </p:sld>
 </file>
 
-<file path=ppt/slides/slide21.xml><?xml version="1.0" encoding="utf-8"?>
+<file path=ppt/slides/slide24.xml><?xml version="1.0" encoding="utf-8"?>
 <p:sld xmlns:a="http://schemas.openxmlformats.org/drawingml/2006/main" xmlns:r="http://schemas.openxmlformats.org/officeDocument/2006/relationships" xmlns:p="http://schemas.openxmlformats.org/presentationml/2006/main">
   <p:cSld>
     <p:spTree>
@@ -2082,6 +3453,106 @@
       </p:grpSpPr>
       <p:pic>
         <p:nvPicPr>
+          <p:cNvPr id="3" name="Grafik 2" descr="Ein Bild, das Diagramm enthält.&#10;&#10;Automatisch generierte Beschreibung">
+            <a:extLst>
+              <a:ext uri="{FF2B5EF4-FFF2-40B4-BE49-F238E27FC236}">
+                <a16:creationId xmlns:a16="http://schemas.microsoft.com/office/drawing/2014/main" id="{DE178B76-E7A3-4D4A-9A5B-DD55767B8AC8}"/>
+              </a:ext>
+            </a:extLst>
+          </p:cNvPr>
+          <p:cNvPicPr>
+            <a:picLocks noChangeAspect="1"/>
+          </p:cNvPicPr>
+          <p:nvPr/>
+        </p:nvPicPr>
+        <p:blipFill rotWithShape="1">
+          <a:blip r:embed="rId2">
+            <a:extLst>
+              <a:ext uri="{28A0092B-C50C-407E-A947-70E740481C1C}">
+                <a14:useLocalDpi xmlns:a14="http://schemas.microsoft.com/office/drawing/2010/main" val="0"/>
+              </a:ext>
+            </a:extLst>
+          </a:blip>
+          <a:srcRect l="84766" t="31664" r="1587" b="30572"/>
+          <a:stretch/>
+        </p:blipFill>
+        <p:spPr>
+          <a:xfrm>
+            <a:off x="5408246" y="2891692"/>
+            <a:ext cx="531446" cy="1305170"/>
+          </a:xfrm>
+          <a:prstGeom prst="rect">
+            <a:avLst/>
+          </a:prstGeom>
+        </p:spPr>
+      </p:pic>
+      <p:pic>
+        <p:nvPicPr>
+          <p:cNvPr id="5" name="Grafik 4" descr="Ein Bild, das Diagramm enthält.&#10;&#10;Automatisch generierte Beschreibung">
+            <a:extLst>
+              <a:ext uri="{FF2B5EF4-FFF2-40B4-BE49-F238E27FC236}">
+                <a16:creationId xmlns:a16="http://schemas.microsoft.com/office/drawing/2014/main" id="{85B3C077-2E34-4320-A766-441B9CC0EA6B}"/>
+              </a:ext>
+            </a:extLst>
+          </p:cNvPr>
+          <p:cNvPicPr>
+            <a:picLocks noChangeAspect="1"/>
+          </p:cNvPicPr>
+          <p:nvPr/>
+        </p:nvPicPr>
+        <p:blipFill rotWithShape="1">
+          <a:blip r:embed="rId3">
+            <a:extLst>
+              <a:ext uri="{28A0092B-C50C-407E-A947-70E740481C1C}">
+                <a14:useLocalDpi xmlns:a14="http://schemas.microsoft.com/office/drawing/2010/main" val="0"/>
+              </a:ext>
+            </a:extLst>
+          </a:blip>
+          <a:srcRect l="93120" t="28945" b="-2"/>
+          <a:stretch/>
+        </p:blipFill>
+        <p:spPr>
+          <a:xfrm>
+            <a:off x="10277231" y="2797908"/>
+            <a:ext cx="315922" cy="2455629"/>
+          </a:xfrm>
+          <a:prstGeom prst="rect">
+            <a:avLst/>
+          </a:prstGeom>
+        </p:spPr>
+      </p:pic>
+    </p:spTree>
+    <p:extLst>
+      <p:ext uri="{BB962C8B-B14F-4D97-AF65-F5344CB8AC3E}">
+        <p14:creationId xmlns:p14="http://schemas.microsoft.com/office/powerpoint/2010/main" val="3711372505"/>
+      </p:ext>
+    </p:extLst>
+  </p:cSld>
+  <p:clrMapOvr>
+    <a:masterClrMapping/>
+  </p:clrMapOvr>
+</p:sld>
+</file>
+
+<file path=ppt/slides/slide4.xml><?xml version="1.0" encoding="utf-8"?>
+<p:sld xmlns:a="http://schemas.openxmlformats.org/drawingml/2006/main" xmlns:r="http://schemas.openxmlformats.org/officeDocument/2006/relationships" xmlns:p="http://schemas.openxmlformats.org/presentationml/2006/main">
+  <p:cSld>
+    <p:spTree>
+      <p:nvGrpSpPr>
+        <p:cNvPr id="1" name=""/>
+        <p:cNvGrpSpPr/>
+        <p:nvPr/>
+      </p:nvGrpSpPr>
+      <p:grpSpPr>
+        <a:xfrm>
+          <a:off x="0" y="0"/>
+          <a:ext cx="0" cy="0"/>
+          <a:chOff x="0" y="0"/>
+          <a:chExt cx="0" cy="0"/>
+        </a:xfrm>
+      </p:grpSpPr>
+      <p:pic>
+        <p:nvPicPr>
           <p:cNvPr id="7" name="Grafik 6">
             <a:extLst>
               <a:ext uri="{FF2B5EF4-FFF2-40B4-BE49-F238E27FC236}">
@@ -2123,7 +3594,7 @@
 </p:sld>
 </file>
 
-<file path=ppt/slides/slide4.xml><?xml version="1.0" encoding="utf-8"?>
+<file path=ppt/slides/slide5.xml><?xml version="1.0" encoding="utf-8"?>
 <p:sld xmlns:a="http://schemas.openxmlformats.org/drawingml/2006/main" xmlns:r="http://schemas.openxmlformats.org/officeDocument/2006/relationships" xmlns:p="http://schemas.openxmlformats.org/presentationml/2006/main">
   <p:cSld>
     <p:spTree>
@@ -2183,7 +3654,7 @@
 </p:sld>
 </file>
 
-<file path=ppt/slides/slide5.xml><?xml version="1.0" encoding="utf-8"?>
+<file path=ppt/slides/slide6.xml><?xml version="1.0" encoding="utf-8"?>
 <p:sld xmlns:a="http://schemas.openxmlformats.org/drawingml/2006/main" xmlns:r="http://schemas.openxmlformats.org/officeDocument/2006/relationships" xmlns:p="http://schemas.openxmlformats.org/presentationml/2006/main">
   <p:cSld>
     <p:spTree>
@@ -2243,7 +3714,7 @@
 </p:sld>
 </file>
 
-<file path=ppt/slides/slide6.xml><?xml version="1.0" encoding="utf-8"?>
+<file path=ppt/slides/slide7.xml><?xml version="1.0" encoding="utf-8"?>
 <p:sld xmlns:a="http://schemas.openxmlformats.org/drawingml/2006/main" xmlns:r="http://schemas.openxmlformats.org/officeDocument/2006/relationships" xmlns:p="http://schemas.openxmlformats.org/presentationml/2006/main">
   <p:cSld>
     <p:spTree>
@@ -2352,7 +3823,7 @@
 </p:sld>
 </file>
 
-<file path=ppt/slides/slide7.xml><?xml version="1.0" encoding="utf-8"?>
+<file path=ppt/slides/slide8.xml><?xml version="1.0" encoding="utf-8"?>
 <p:sld xmlns:a="http://schemas.openxmlformats.org/drawingml/2006/main" xmlns:r="http://schemas.openxmlformats.org/officeDocument/2006/relationships" xmlns:p="http://schemas.openxmlformats.org/presentationml/2006/main">
   <p:cSld>
     <p:spTree>
@@ -2461,7 +3932,7 @@
 </p:sld>
 </file>
 
-<file path=ppt/slides/slide8.xml><?xml version="1.0" encoding="utf-8"?>
+<file path=ppt/slides/slide9.xml><?xml version="1.0" encoding="utf-8"?>
 <p:sld xmlns:a="http://schemas.openxmlformats.org/drawingml/2006/main" xmlns:r="http://schemas.openxmlformats.org/officeDocument/2006/relationships" xmlns:p="http://schemas.openxmlformats.org/presentationml/2006/main">
   <p:cSld>
     <p:spTree>
@@ -2512,346 +3983,6 @@
     <p:extLst>
       <p:ext uri="{BB962C8B-B14F-4D97-AF65-F5344CB8AC3E}">
         <p14:creationId xmlns:p14="http://schemas.microsoft.com/office/powerpoint/2010/main" val="2727137433"/>
-      </p:ext>
-    </p:extLst>
-  </p:cSld>
-  <p:clrMapOvr>
-    <a:masterClrMapping/>
-  </p:clrMapOvr>
-</p:sld>
-</file>
-
-<file path=ppt/slides/slide9.xml><?xml version="1.0" encoding="utf-8"?>
-<p:sld xmlns:a="http://schemas.openxmlformats.org/drawingml/2006/main" xmlns:r="http://schemas.openxmlformats.org/officeDocument/2006/relationships" xmlns:p="http://schemas.openxmlformats.org/presentationml/2006/main">
-  <p:cSld>
-    <p:spTree>
-      <p:nvGrpSpPr>
-        <p:cNvPr id="1" name=""/>
-        <p:cNvGrpSpPr/>
-        <p:nvPr/>
-      </p:nvGrpSpPr>
-      <p:grpSpPr>
-        <a:xfrm>
-          <a:off x="0" y="0"/>
-          <a:ext cx="0" cy="0"/>
-          <a:chOff x="0" y="0"/>
-          <a:chExt cx="0" cy="0"/>
-        </a:xfrm>
-      </p:grpSpPr>
-      <p:grpSp>
-        <p:nvGrpSpPr>
-          <p:cNvPr id="10" name="Gruppieren 9">
-            <a:extLst>
-              <a:ext uri="{FF2B5EF4-FFF2-40B4-BE49-F238E27FC236}">
-                <a16:creationId xmlns:a16="http://schemas.microsoft.com/office/drawing/2014/main" id="{7DC4B550-49AD-44DA-9BDB-FE8A014B4A0C}"/>
-              </a:ext>
-            </a:extLst>
-          </p:cNvPr>
-          <p:cNvGrpSpPr/>
-          <p:nvPr/>
-        </p:nvGrpSpPr>
-        <p:grpSpPr>
-          <a:xfrm>
-            <a:off x="2786062" y="1657350"/>
-            <a:ext cx="6619875" cy="3543300"/>
-            <a:chOff x="2786062" y="1657350"/>
-            <a:chExt cx="6619875" cy="3543300"/>
-          </a:xfrm>
-        </p:grpSpPr>
-        <p:pic>
-          <p:nvPicPr>
-            <p:cNvPr id="2" name="Grafik 1">
-              <a:extLst>
-                <a:ext uri="{FF2B5EF4-FFF2-40B4-BE49-F238E27FC236}">
-                  <a16:creationId xmlns:a16="http://schemas.microsoft.com/office/drawing/2014/main" id="{17DE90D8-06D7-4452-8D1F-63E288DCF25B}"/>
-                </a:ext>
-              </a:extLst>
-            </p:cNvPr>
-            <p:cNvPicPr>
-              <a:picLocks noChangeAspect="1"/>
-            </p:cNvPicPr>
-            <p:nvPr/>
-          </p:nvPicPr>
-          <p:blipFill>
-            <a:blip r:embed="rId2"/>
-            <a:stretch>
-              <a:fillRect/>
-            </a:stretch>
-          </p:blipFill>
-          <p:spPr>
-            <a:xfrm>
-              <a:off x="2786062" y="1657350"/>
-              <a:ext cx="6619875" cy="3543300"/>
-            </a:xfrm>
-            <a:prstGeom prst="rect">
-              <a:avLst/>
-            </a:prstGeom>
-          </p:spPr>
-        </p:pic>
-        <p:sp>
-          <p:nvSpPr>
-            <p:cNvPr id="3" name="Textfeld 2">
-              <a:extLst>
-                <a:ext uri="{FF2B5EF4-FFF2-40B4-BE49-F238E27FC236}">
-                  <a16:creationId xmlns:a16="http://schemas.microsoft.com/office/drawing/2014/main" id="{4859D943-C35C-4B26-88FB-10078045F4C7}"/>
-                </a:ext>
-              </a:extLst>
-            </p:cNvPr>
-            <p:cNvSpPr txBox="1"/>
-            <p:nvPr/>
-          </p:nvSpPr>
-          <p:spPr>
-            <a:xfrm>
-              <a:off x="7165909" y="3290500"/>
-              <a:ext cx="1166327" cy="276999"/>
-            </a:xfrm>
-            <a:prstGeom prst="rect">
-              <a:avLst/>
-            </a:prstGeom>
-            <a:noFill/>
-          </p:spPr>
-          <p:txBody>
-            <a:bodyPr wrap="square" rtlCol="0">
-              <a:spAutoFit/>
-            </a:bodyPr>
-            <a:lstStyle/>
-            <a:p>
-              <a:r>
-                <a:rPr lang="de-AT" sz="1200" dirty="0">
-                  <a:latin typeface="DejaVu Sans"/>
-                </a:rPr>
-                <a:t>flat1</a:t>
-              </a:r>
-            </a:p>
-          </p:txBody>
-        </p:sp>
-        <p:sp>
-          <p:nvSpPr>
-            <p:cNvPr id="4" name="Textfeld 3">
-              <a:extLst>
-                <a:ext uri="{FF2B5EF4-FFF2-40B4-BE49-F238E27FC236}">
-                  <a16:creationId xmlns:a16="http://schemas.microsoft.com/office/drawing/2014/main" id="{76E78B6F-387F-457D-9F5D-AAC91CFF73AB}"/>
-                </a:ext>
-              </a:extLst>
-            </p:cNvPr>
-            <p:cNvSpPr txBox="1"/>
-            <p:nvPr/>
-          </p:nvSpPr>
-          <p:spPr>
-            <a:xfrm>
-              <a:off x="5386872" y="4021398"/>
-              <a:ext cx="1166327" cy="276999"/>
-            </a:xfrm>
-            <a:prstGeom prst="rect">
-              <a:avLst/>
-            </a:prstGeom>
-            <a:noFill/>
-          </p:spPr>
-          <p:txBody>
-            <a:bodyPr wrap="square" rtlCol="0">
-              <a:spAutoFit/>
-            </a:bodyPr>
-            <a:lstStyle/>
-            <a:p>
-              <a:r>
-                <a:rPr lang="de-AT" sz="1200" dirty="0">
-                  <a:latin typeface="DejaVu Sans"/>
-                </a:rPr>
-                <a:t>uphill1</a:t>
-              </a:r>
-            </a:p>
-          </p:txBody>
-        </p:sp>
-        <p:sp>
-          <p:nvSpPr>
-            <p:cNvPr id="5" name="Textfeld 4">
-              <a:extLst>
-                <a:ext uri="{FF2B5EF4-FFF2-40B4-BE49-F238E27FC236}">
-                  <a16:creationId xmlns:a16="http://schemas.microsoft.com/office/drawing/2014/main" id="{2663BE87-97F4-408B-9BF6-362188E12DBB}"/>
-                </a:ext>
-              </a:extLst>
-            </p:cNvPr>
-            <p:cNvSpPr txBox="1"/>
-            <p:nvPr/>
-          </p:nvSpPr>
-          <p:spPr>
-            <a:xfrm>
-              <a:off x="4803708" y="4334025"/>
-              <a:ext cx="1166327" cy="276999"/>
-            </a:xfrm>
-            <a:prstGeom prst="rect">
-              <a:avLst/>
-            </a:prstGeom>
-            <a:noFill/>
-          </p:spPr>
-          <p:txBody>
-            <a:bodyPr wrap="square" rtlCol="0">
-              <a:spAutoFit/>
-            </a:bodyPr>
-            <a:lstStyle/>
-            <a:p>
-              <a:r>
-                <a:rPr lang="de-AT" sz="1200" dirty="0">
-                  <a:latin typeface="DejaVu Sans"/>
-                </a:rPr>
-                <a:t>down1</a:t>
-              </a:r>
-            </a:p>
-          </p:txBody>
-        </p:sp>
-        <p:sp>
-          <p:nvSpPr>
-            <p:cNvPr id="6" name="Textfeld 5">
-              <a:extLst>
-                <a:ext uri="{FF2B5EF4-FFF2-40B4-BE49-F238E27FC236}">
-                  <a16:creationId xmlns:a16="http://schemas.microsoft.com/office/drawing/2014/main" id="{7AB1CA2F-4C83-4E1F-B22D-8AEC79F9CF74}"/>
-                </a:ext>
-              </a:extLst>
-            </p:cNvPr>
-            <p:cNvSpPr txBox="1"/>
-            <p:nvPr/>
-          </p:nvSpPr>
-          <p:spPr>
-            <a:xfrm>
-              <a:off x="3901749" y="4298397"/>
-              <a:ext cx="1166327" cy="276999"/>
-            </a:xfrm>
-            <a:prstGeom prst="rect">
-              <a:avLst/>
-            </a:prstGeom>
-            <a:noFill/>
-          </p:spPr>
-          <p:txBody>
-            <a:bodyPr wrap="square" rtlCol="0">
-              <a:spAutoFit/>
-            </a:bodyPr>
-            <a:lstStyle/>
-            <a:p>
-              <a:r>
-                <a:rPr lang="de-AT" sz="1200" dirty="0">
-                  <a:latin typeface="DejaVu Sans"/>
-                </a:rPr>
-                <a:t>turn</a:t>
-              </a:r>
-            </a:p>
-          </p:txBody>
-        </p:sp>
-        <p:sp>
-          <p:nvSpPr>
-            <p:cNvPr id="7" name="Textfeld 6">
-              <a:extLst>
-                <a:ext uri="{FF2B5EF4-FFF2-40B4-BE49-F238E27FC236}">
-                  <a16:creationId xmlns:a16="http://schemas.microsoft.com/office/drawing/2014/main" id="{246007F0-E608-4BB8-91FC-6A36D9C1D256}"/>
-                </a:ext>
-              </a:extLst>
-            </p:cNvPr>
-            <p:cNvSpPr txBox="1"/>
-            <p:nvPr/>
-          </p:nvSpPr>
-          <p:spPr>
-            <a:xfrm>
-              <a:off x="3967063" y="3467400"/>
-              <a:ext cx="1166327" cy="276999"/>
-            </a:xfrm>
-            <a:prstGeom prst="rect">
-              <a:avLst/>
-            </a:prstGeom>
-            <a:noFill/>
-          </p:spPr>
-          <p:txBody>
-            <a:bodyPr wrap="square" rtlCol="0">
-              <a:spAutoFit/>
-            </a:bodyPr>
-            <a:lstStyle/>
-            <a:p>
-              <a:r>
-                <a:rPr lang="de-AT" sz="1200" dirty="0">
-                  <a:latin typeface="DejaVu Sans"/>
-                </a:rPr>
-                <a:t>uphill2</a:t>
-              </a:r>
-            </a:p>
-          </p:txBody>
-        </p:sp>
-        <p:sp>
-          <p:nvSpPr>
-            <p:cNvPr id="8" name="Textfeld 7">
-              <a:extLst>
-                <a:ext uri="{FF2B5EF4-FFF2-40B4-BE49-F238E27FC236}">
-                  <a16:creationId xmlns:a16="http://schemas.microsoft.com/office/drawing/2014/main" id="{A1270D32-655B-4141-873F-984FBB3142B2}"/>
-                </a:ext>
-              </a:extLst>
-            </p:cNvPr>
-            <p:cNvSpPr txBox="1"/>
-            <p:nvPr/>
-          </p:nvSpPr>
-          <p:spPr>
-            <a:xfrm>
-              <a:off x="4803707" y="2998001"/>
-              <a:ext cx="1166327" cy="276999"/>
-            </a:xfrm>
-            <a:prstGeom prst="rect">
-              <a:avLst/>
-            </a:prstGeom>
-            <a:noFill/>
-          </p:spPr>
-          <p:txBody>
-            <a:bodyPr wrap="square" rtlCol="0">
-              <a:spAutoFit/>
-            </a:bodyPr>
-            <a:lstStyle/>
-            <a:p>
-              <a:r>
-                <a:rPr lang="de-AT" sz="1200" dirty="0">
-                  <a:latin typeface="DejaVu Sans"/>
-                </a:rPr>
-                <a:t>down2</a:t>
-              </a:r>
-            </a:p>
-          </p:txBody>
-        </p:sp>
-        <p:sp>
-          <p:nvSpPr>
-            <p:cNvPr id="9" name="Textfeld 8">
-              <a:extLst>
-                <a:ext uri="{FF2B5EF4-FFF2-40B4-BE49-F238E27FC236}">
-                  <a16:creationId xmlns:a16="http://schemas.microsoft.com/office/drawing/2014/main" id="{6EEC0829-EF48-4D60-B6BF-73EA0342B29F}"/>
-                </a:ext>
-              </a:extLst>
-            </p:cNvPr>
-            <p:cNvSpPr txBox="1"/>
-            <p:nvPr/>
-          </p:nvSpPr>
-          <p:spPr>
-            <a:xfrm>
-              <a:off x="6095999" y="2423876"/>
-              <a:ext cx="1166327" cy="276999"/>
-            </a:xfrm>
-            <a:prstGeom prst="rect">
-              <a:avLst/>
-            </a:prstGeom>
-            <a:noFill/>
-          </p:spPr>
-          <p:txBody>
-            <a:bodyPr wrap="square" rtlCol="0">
-              <a:spAutoFit/>
-            </a:bodyPr>
-            <a:lstStyle/>
-            <a:p>
-              <a:r>
-                <a:rPr lang="de-AT" sz="1200" dirty="0">
-                  <a:latin typeface="DejaVu Sans"/>
-                </a:rPr>
-                <a:t>flat2</a:t>
-              </a:r>
-            </a:p>
-          </p:txBody>
-        </p:sp>
-      </p:grpSp>
-    </p:spTree>
-    <p:extLst>
-      <p:ext uri="{BB962C8B-B14F-4D97-AF65-F5344CB8AC3E}">
-        <p14:creationId xmlns:p14="http://schemas.microsoft.com/office/powerpoint/2010/main" val="2986862466"/>
       </p:ext>
     </p:extLst>
   </p:cSld>

</xml_diff>